<commit_message>
Added link to PowerBoots. Added comment from Jeffrey Snover about "digging ourselves out of a 30 year hole."
</commit_message>
<xml_diff>
--- a/the-power-of-powershell/presentation.pptx
+++ b/the-power-of-powershell/presentation.pptx
@@ -223,7 +223,7 @@
             <a:fld id="{B9B93FB1-DF36-440F-A433-3E8F756D0415}" type="datetimeFigureOut">
               <a:rPr lang="en-US" smtClean="0"/>
               <a:pPr/>
-              <a:t>4/20/2009</a:t>
+              <a:t>4/21/2009</a:t>
             </a:fld>
             <a:endParaRPr lang="en-US"/>
           </a:p>
@@ -385,7 +385,7 @@
             <a:fld id="{C89EC058-892F-4F50-9EA1-1F3B0A11E872}" type="datetimeFigureOut">
               <a:rPr lang="en-US" smtClean="0"/>
               <a:pPr/>
-              <a:t>4/20/2009</a:t>
+              <a:t>4/21/2009</a:t>
             </a:fld>
             <a:endParaRPr lang="en-US"/>
           </a:p>
@@ -7141,7 +7141,7 @@
             <a:fld id="{85F33A90-6586-4AF8-955D-4A449BF70A77}" type="datetimeFigureOut">
               <a:rPr lang="en-US" smtClean="0"/>
               <a:pPr/>
-              <a:t>4/20/2009</a:t>
+              <a:t>4/21/2009</a:t>
             </a:fld>
             <a:endParaRPr lang="en-US"/>
           </a:p>
@@ -7332,7 +7332,7 @@
             <a:fld id="{85F33A90-6586-4AF8-955D-4A449BF70A77}" type="datetimeFigureOut">
               <a:rPr lang="en-US" smtClean="0"/>
               <a:pPr/>
-              <a:t>4/20/2009</a:t>
+              <a:t>4/21/2009</a:t>
             </a:fld>
             <a:endParaRPr lang="en-US"/>
           </a:p>
@@ -7509,7 +7509,7 @@
             <a:fld id="{85F33A90-6586-4AF8-955D-4A449BF70A77}" type="datetimeFigureOut">
               <a:rPr lang="en-US" smtClean="0"/>
               <a:pPr/>
-              <a:t>4/20/2009</a:t>
+              <a:t>4/21/2009</a:t>
             </a:fld>
             <a:endParaRPr lang="en-US"/>
           </a:p>
@@ -7680,7 +7680,7 @@
             <a:fld id="{85F33A90-6586-4AF8-955D-4A449BF70A77}" type="datetimeFigureOut">
               <a:rPr lang="en-US" smtClean="0"/>
               <a:pPr/>
-              <a:t>4/20/2009</a:t>
+              <a:t>4/21/2009</a:t>
             </a:fld>
             <a:endParaRPr lang="en-US"/>
           </a:p>
@@ -8137,7 +8137,7 @@
             <a:fld id="{85F33A90-6586-4AF8-955D-4A449BF70A77}" type="datetimeFigureOut">
               <a:rPr lang="en-US" smtClean="0"/>
               <a:pPr/>
-              <a:t>4/20/2009</a:t>
+              <a:t>4/21/2009</a:t>
             </a:fld>
             <a:endParaRPr lang="en-US"/>
           </a:p>
@@ -8427,7 +8427,7 @@
             <a:fld id="{85F33A90-6586-4AF8-955D-4A449BF70A77}" type="datetimeFigureOut">
               <a:rPr lang="en-US" smtClean="0"/>
               <a:pPr/>
-              <a:t>4/20/2009</a:t>
+              <a:t>4/21/2009</a:t>
             </a:fld>
             <a:endParaRPr lang="en-US"/>
           </a:p>
@@ -8803,7 +8803,7 @@
             <a:fld id="{85F33A90-6586-4AF8-955D-4A449BF70A77}" type="datetimeFigureOut">
               <a:rPr lang="en-US" smtClean="0"/>
               <a:pPr/>
-              <a:t>4/20/2009</a:t>
+              <a:t>4/21/2009</a:t>
             </a:fld>
             <a:endParaRPr lang="en-US"/>
           </a:p>
@@ -8951,7 +8951,7 @@
             <a:fld id="{85F33A90-6586-4AF8-955D-4A449BF70A77}" type="datetimeFigureOut">
               <a:rPr lang="en-US" smtClean="0"/>
               <a:pPr/>
-              <a:t>4/20/2009</a:t>
+              <a:t>4/21/2009</a:t>
             </a:fld>
             <a:endParaRPr lang="en-US"/>
           </a:p>
@@ -9043,7 +9043,7 @@
             <a:fld id="{85F33A90-6586-4AF8-955D-4A449BF70A77}" type="datetimeFigureOut">
               <a:rPr lang="en-US" smtClean="0"/>
               <a:pPr/>
-              <a:t>4/20/2009</a:t>
+              <a:t>4/21/2009</a:t>
             </a:fld>
             <a:endParaRPr lang="en-US"/>
           </a:p>
@@ -9294,7 +9294,7 @@
             <a:fld id="{85F33A90-6586-4AF8-955D-4A449BF70A77}" type="datetimeFigureOut">
               <a:rPr lang="en-US" smtClean="0"/>
               <a:pPr/>
-              <a:t>4/20/2009</a:t>
+              <a:t>4/21/2009</a:t>
             </a:fld>
             <a:endParaRPr lang="en-US"/>
           </a:p>
@@ -9555,7 +9555,7 @@
             <a:fld id="{85F33A90-6586-4AF8-955D-4A449BF70A77}" type="datetimeFigureOut">
               <a:rPr lang="en-US" smtClean="0"/>
               <a:pPr/>
-              <a:t>4/20/2009</a:t>
+              <a:t>4/21/2009</a:t>
             </a:fld>
             <a:endParaRPr lang="en-US"/>
           </a:p>
@@ -9985,7 +9985,7 @@
             <a:fld id="{85F33A90-6586-4AF8-955D-4A449BF70A77}" type="datetimeFigureOut">
               <a:rPr lang="en-US" smtClean="0"/>
               <a:pPr/>
-              <a:t>4/20/2009</a:t>
+              <a:t>4/21/2009</a:t>
             </a:fld>
             <a:endParaRPr lang="en-US"/>
           </a:p>
@@ -10496,11 +10496,7 @@
             <a:pPr algn="r"/>
             <a:r>
               <a:rPr lang="en-US" dirty="0" smtClean="0"/>
-              <a:t>April 25, </a:t>
-            </a:r>
-            <a:r>
-              <a:rPr lang="en-US" dirty="0" smtClean="0"/>
-              <a:t>2009</a:t>
+              <a:t>April 25, 2009</a:t>
             </a:r>
           </a:p>
           <a:p>
@@ -10823,10 +10819,15 @@
             <p:ph idx="1"/>
           </p:nvPr>
         </p:nvSpPr>
-        <p:spPr/>
+        <p:spPr>
+          <a:xfrm>
+            <a:off x="457200" y="1600200"/>
+            <a:ext cx="7467600" cy="4876800"/>
+          </a:xfrm>
+        </p:spPr>
         <p:txBody>
           <a:bodyPr>
-            <a:normAutofit fontScale="85000" lnSpcReduction="20000"/>
+            <a:normAutofit fontScale="77500" lnSpcReduction="20000"/>
           </a:bodyPr>
           <a:lstStyle/>
           <a:p>
@@ -10901,6 +10902,54 @@
             </a:r>
           </a:p>
           <a:p>
+            <a:endParaRPr lang="en-US" dirty="0" smtClean="0"/>
+          </a:p>
+          <a:p>
+            <a:pPr>
+              <a:buNone/>
+            </a:pPr>
+            <a:r>
+              <a:rPr lang="en-US" dirty="0" smtClean="0">
+                <a:hlinkClick r:id="rId3"/>
+              </a:rPr>
+              <a:t>“We are digging ourselves out of a 30 year hole.” – Jeffrey </a:t>
+            </a:r>
+            <a:r>
+              <a:rPr lang="en-US" dirty="0" err="1" smtClean="0">
+                <a:hlinkClick r:id="rId3"/>
+              </a:rPr>
+              <a:t>Snover’s</a:t>
+            </a:r>
+            <a:r>
+              <a:rPr lang="en-US" dirty="0" smtClean="0">
+                <a:hlinkClick r:id="rId3"/>
+              </a:rPr>
+              <a:t> </a:t>
+            </a:r>
+            <a:r>
+              <a:rPr lang="en-US" dirty="0" err="1" smtClean="0">
+                <a:hlinkClick r:id="rId3"/>
+              </a:rPr>
+              <a:t>Lang.Net</a:t>
+            </a:r>
+            <a:r>
+              <a:rPr lang="en-US" dirty="0" smtClean="0">
+                <a:hlinkClick r:id="rId3"/>
+              </a:rPr>
+              <a:t> </a:t>
+            </a:r>
+            <a:r>
+              <a:rPr lang="en-US" dirty="0" err="1" smtClean="0">
+                <a:hlinkClick r:id="rId3"/>
+              </a:rPr>
+              <a:t>PowerShell</a:t>
+            </a:r>
+            <a:r>
+              <a:rPr lang="en-US" dirty="0" smtClean="0">
+                <a:hlinkClick r:id="rId3"/>
+              </a:rPr>
+              <a:t> Talk</a:t>
+            </a:r>
             <a:endParaRPr lang="en-US" dirty="0"/>
           </a:p>
         </p:txBody>

</xml_diff>

<commit_message>
Added some slides and removed some blank lines from the reference file.
</commit_message>
<xml_diff>
--- a/the-power-of-powershell/presentation.pptx
+++ b/the-power-of-powershell/presentation.pptx
@@ -5424,8 +5424,30 @@
             </a:r>
             <a:r>
               <a:rPr lang="en-US" baseline="0" dirty="0" smtClean="0"/>
-              <a:t> than I could have had I browsed to it via Windows Explorer.</a:t>
-            </a:r>
+              <a:t> than I could have had I browsed to it via Windows Explorer</a:t>
+            </a:r>
+            <a:r>
+              <a:rPr lang="en-US" baseline="0" dirty="0" smtClean="0"/>
+              <a:t>.</a:t>
+            </a:r>
+          </a:p>
+          <a:p>
+            <a:endParaRPr lang="en-US" baseline="0" dirty="0" smtClean="0"/>
+          </a:p>
+          <a:p>
+            <a:r>
+              <a:rPr lang="en-US" baseline="0" dirty="0" smtClean="0"/>
+              <a:t>“We are digging ourselves out of a 30 year hole.” – The context for that quote was regarding what is bad about </a:t>
+            </a:r>
+            <a:r>
+              <a:rPr lang="en-US" baseline="0" dirty="0" err="1" smtClean="0"/>
+              <a:t>PowerShell</a:t>
+            </a:r>
+            <a:r>
+              <a:rPr lang="en-US" baseline="0" dirty="0" smtClean="0"/>
+              <a:t>.</a:t>
+            </a:r>
+            <a:endParaRPr lang="en-US" baseline="0" dirty="0" smtClean="0"/>
           </a:p>
         </p:txBody>
       </p:sp>
@@ -11474,7 +11496,7 @@
         <p:spPr/>
         <p:txBody>
           <a:bodyPr>
-            <a:normAutofit fontScale="92500"/>
+            <a:normAutofit fontScale="92500" lnSpcReduction="10000"/>
           </a:bodyPr>
           <a:lstStyle/>
           <a:p>
@@ -11515,8 +11537,20 @@
             <a:pPr lvl="1"/>
             <a:r>
               <a:rPr lang="en-US" dirty="0" smtClean="0"/>
-              <a:t>String parsing</a:t>
-            </a:r>
+              <a:t>String </a:t>
+            </a:r>
+            <a:r>
+              <a:rPr lang="en-US" dirty="0" smtClean="0"/>
+              <a:t>parsing</a:t>
+            </a:r>
+          </a:p>
+          <a:p>
+            <a:pPr lvl="1"/>
+            <a:r>
+              <a:rPr lang="en-US" dirty="0" smtClean="0"/>
+              <a:t>“Prayer-based parsing”</a:t>
+            </a:r>
+            <a:endParaRPr lang="en-US" dirty="0" smtClean="0"/>
           </a:p>
           <a:p>
             <a:endParaRPr lang="en-US" dirty="0" smtClean="0"/>
@@ -12936,8 +12970,8 @@
         </p:nvSpPr>
         <p:spPr>
           <a:xfrm>
-            <a:off x="457200" y="1600200"/>
-            <a:ext cx="8153400" cy="5257800"/>
+            <a:off x="457200" y="1295400"/>
+            <a:ext cx="8153400" cy="5715000"/>
           </a:xfrm>
         </p:spPr>
         <p:txBody>
@@ -13035,8 +13069,28 @@
             <a:pPr lvl="1"/>
             <a:r>
               <a:rPr lang="en-US" dirty="0" smtClean="0"/>
-              <a:t>Included in all server productions from 2009 forward</a:t>
-            </a:r>
+              <a:t>Included in all server productions from 2009 </a:t>
+            </a:r>
+            <a:r>
+              <a:rPr lang="en-US" dirty="0" smtClean="0"/>
+              <a:t>forward</a:t>
+            </a:r>
+          </a:p>
+          <a:p>
+            <a:pPr lvl="1"/>
+            <a:r>
+              <a:rPr lang="en-US" dirty="0" smtClean="0"/>
+              <a:t>All future administration GUIs will be built on </a:t>
+            </a:r>
+            <a:r>
+              <a:rPr lang="en-US" dirty="0" err="1" smtClean="0"/>
+              <a:t>PowerShell</a:t>
+            </a:r>
+            <a:r>
+              <a:rPr lang="en-US" dirty="0" smtClean="0"/>
+              <a:t> (allows scripting anything)</a:t>
+            </a:r>
+            <a:endParaRPr lang="en-US" dirty="0" smtClean="0"/>
           </a:p>
           <a:p>
             <a:pPr lvl="1"/>

</xml_diff>

<commit_message>
Added link to PowerBoots and a small demo page for Boots stuff.
</commit_message>
<xml_diff>
--- a/the-power-of-powershell/presentation.pptx
+++ b/the-power-of-powershell/presentation.pptx
@@ -5,10 +5,10 @@
     <p:sldMasterId id="2147483660" r:id="rId1"/>
   </p:sldMasterIdLst>
   <p:notesMasterIdLst>
-    <p:notesMasterId r:id="rId30"/>
+    <p:notesMasterId r:id="rId31"/>
   </p:notesMasterIdLst>
   <p:handoutMasterIdLst>
-    <p:handoutMasterId r:id="rId31"/>
+    <p:handoutMasterId r:id="rId32"/>
   </p:handoutMasterIdLst>
   <p:sldIdLst>
     <p:sldId id="256" r:id="rId2"/>
@@ -37,8 +37,9 @@
     <p:sldId id="283" r:id="rId25"/>
     <p:sldId id="286" r:id="rId26"/>
     <p:sldId id="287" r:id="rId27"/>
-    <p:sldId id="279" r:id="rId28"/>
-    <p:sldId id="284" r:id="rId29"/>
+    <p:sldId id="288" r:id="rId28"/>
+    <p:sldId id="279" r:id="rId29"/>
+    <p:sldId id="284" r:id="rId30"/>
   </p:sldIdLst>
   <p:sldSz cx="9144000" cy="6858000" type="screen4x3"/>
   <p:notesSz cx="6858000" cy="9144000"/>
@@ -223,7 +224,7 @@
             <a:fld id="{B9B93FB1-DF36-440F-A433-3E8F756D0415}" type="datetimeFigureOut">
               <a:rPr lang="en-US" smtClean="0"/>
               <a:pPr/>
-              <a:t>4/21/2009</a:t>
+              <a:t>4/23/2009</a:t>
             </a:fld>
             <a:endParaRPr lang="en-US"/>
           </a:p>
@@ -385,7 +386,7 @@
             <a:fld id="{C89EC058-892F-4F50-9EA1-1F3B0A11E872}" type="datetimeFigureOut">
               <a:rPr lang="en-US" smtClean="0"/>
               <a:pPr/>
-              <a:t>4/21/2009</a:t>
+              <a:t>4/23/2009</a:t>
             </a:fld>
             <a:endParaRPr lang="en-US"/>
           </a:p>
@@ -4680,7 +4681,7 @@
             <a:fld id="{5FD7F0AD-5F3B-4E9C-B332-A6DF54A738BE}" type="slidenum">
               <a:rPr lang="en-US" smtClean="0"/>
               <a:pPr/>
-              <a:t>27</a:t>
+              <a:t>28</a:t>
             </a:fld>
             <a:endParaRPr lang="en-US"/>
           </a:p>
@@ -5424,30 +5425,25 @@
             </a:r>
             <a:r>
               <a:rPr lang="en-US" baseline="0" dirty="0" smtClean="0"/>
-              <a:t> than I could have had I browsed to it via Windows Explorer</a:t>
+              <a:t> than I could have had I browsed to it via Windows Explorer.</a:t>
+            </a:r>
+          </a:p>
+          <a:p>
+            <a:endParaRPr lang="en-US" baseline="0" dirty="0" smtClean="0"/>
+          </a:p>
+          <a:p>
+            <a:r>
+              <a:rPr lang="en-US" baseline="0" dirty="0" smtClean="0"/>
+              <a:t>“We are digging ourselves out of a 30 year hole.” – The context for that quote was regarding what is bad about </a:t>
+            </a:r>
+            <a:r>
+              <a:rPr lang="en-US" baseline="0" dirty="0" err="1" smtClean="0"/>
+              <a:t>PowerShell</a:t>
             </a:r>
             <a:r>
               <a:rPr lang="en-US" baseline="0" dirty="0" smtClean="0"/>
               <a:t>.</a:t>
             </a:r>
-          </a:p>
-          <a:p>
-            <a:endParaRPr lang="en-US" baseline="0" dirty="0" smtClean="0"/>
-          </a:p>
-          <a:p>
-            <a:r>
-              <a:rPr lang="en-US" baseline="0" dirty="0" smtClean="0"/>
-              <a:t>“We are digging ourselves out of a 30 year hole.” – The context for that quote was regarding what is bad about </a:t>
-            </a:r>
-            <a:r>
-              <a:rPr lang="en-US" baseline="0" dirty="0" err="1" smtClean="0"/>
-              <a:t>PowerShell</a:t>
-            </a:r>
-            <a:r>
-              <a:rPr lang="en-US" baseline="0" dirty="0" smtClean="0"/>
-              <a:t>.</a:t>
-            </a:r>
-            <a:endParaRPr lang="en-US" baseline="0" dirty="0" smtClean="0"/>
           </a:p>
         </p:txBody>
       </p:sp>
@@ -7163,7 +7159,7 @@
             <a:fld id="{85F33A90-6586-4AF8-955D-4A449BF70A77}" type="datetimeFigureOut">
               <a:rPr lang="en-US" smtClean="0"/>
               <a:pPr/>
-              <a:t>4/21/2009</a:t>
+              <a:t>4/23/2009</a:t>
             </a:fld>
             <a:endParaRPr lang="en-US"/>
           </a:p>
@@ -7354,7 +7350,7 @@
             <a:fld id="{85F33A90-6586-4AF8-955D-4A449BF70A77}" type="datetimeFigureOut">
               <a:rPr lang="en-US" smtClean="0"/>
               <a:pPr/>
-              <a:t>4/21/2009</a:t>
+              <a:t>4/23/2009</a:t>
             </a:fld>
             <a:endParaRPr lang="en-US"/>
           </a:p>
@@ -7531,7 +7527,7 @@
             <a:fld id="{85F33A90-6586-4AF8-955D-4A449BF70A77}" type="datetimeFigureOut">
               <a:rPr lang="en-US" smtClean="0"/>
               <a:pPr/>
-              <a:t>4/21/2009</a:t>
+              <a:t>4/23/2009</a:t>
             </a:fld>
             <a:endParaRPr lang="en-US"/>
           </a:p>
@@ -7702,7 +7698,7 @@
             <a:fld id="{85F33A90-6586-4AF8-955D-4A449BF70A77}" type="datetimeFigureOut">
               <a:rPr lang="en-US" smtClean="0"/>
               <a:pPr/>
-              <a:t>4/21/2009</a:t>
+              <a:t>4/23/2009</a:t>
             </a:fld>
             <a:endParaRPr lang="en-US"/>
           </a:p>
@@ -8159,7 +8155,7 @@
             <a:fld id="{85F33A90-6586-4AF8-955D-4A449BF70A77}" type="datetimeFigureOut">
               <a:rPr lang="en-US" smtClean="0"/>
               <a:pPr/>
-              <a:t>4/21/2009</a:t>
+              <a:t>4/23/2009</a:t>
             </a:fld>
             <a:endParaRPr lang="en-US"/>
           </a:p>
@@ -8449,7 +8445,7 @@
             <a:fld id="{85F33A90-6586-4AF8-955D-4A449BF70A77}" type="datetimeFigureOut">
               <a:rPr lang="en-US" smtClean="0"/>
               <a:pPr/>
-              <a:t>4/21/2009</a:t>
+              <a:t>4/23/2009</a:t>
             </a:fld>
             <a:endParaRPr lang="en-US"/>
           </a:p>
@@ -8825,7 +8821,7 @@
             <a:fld id="{85F33A90-6586-4AF8-955D-4A449BF70A77}" type="datetimeFigureOut">
               <a:rPr lang="en-US" smtClean="0"/>
               <a:pPr/>
-              <a:t>4/21/2009</a:t>
+              <a:t>4/23/2009</a:t>
             </a:fld>
             <a:endParaRPr lang="en-US"/>
           </a:p>
@@ -8973,7 +8969,7 @@
             <a:fld id="{85F33A90-6586-4AF8-955D-4A449BF70A77}" type="datetimeFigureOut">
               <a:rPr lang="en-US" smtClean="0"/>
               <a:pPr/>
-              <a:t>4/21/2009</a:t>
+              <a:t>4/23/2009</a:t>
             </a:fld>
             <a:endParaRPr lang="en-US"/>
           </a:p>
@@ -9065,7 +9061,7 @@
             <a:fld id="{85F33A90-6586-4AF8-955D-4A449BF70A77}" type="datetimeFigureOut">
               <a:rPr lang="en-US" smtClean="0"/>
               <a:pPr/>
-              <a:t>4/21/2009</a:t>
+              <a:t>4/23/2009</a:t>
             </a:fld>
             <a:endParaRPr lang="en-US"/>
           </a:p>
@@ -9316,7 +9312,7 @@
             <a:fld id="{85F33A90-6586-4AF8-955D-4A449BF70A77}" type="datetimeFigureOut">
               <a:rPr lang="en-US" smtClean="0"/>
               <a:pPr/>
-              <a:t>4/21/2009</a:t>
+              <a:t>4/23/2009</a:t>
             </a:fld>
             <a:endParaRPr lang="en-US"/>
           </a:p>
@@ -9577,7 +9573,7 @@
             <a:fld id="{85F33A90-6586-4AF8-955D-4A449BF70A77}" type="datetimeFigureOut">
               <a:rPr lang="en-US" smtClean="0"/>
               <a:pPr/>
-              <a:t>4/21/2009</a:t>
+              <a:t>4/23/2009</a:t>
             </a:fld>
             <a:endParaRPr lang="en-US"/>
           </a:p>
@@ -10007,7 +10003,7 @@
             <a:fld id="{85F33A90-6586-4AF8-955D-4A449BF70A77}" type="datetimeFigureOut">
               <a:rPr lang="en-US" smtClean="0"/>
               <a:pPr/>
-              <a:t>4/21/2009</a:t>
+              <a:t>4/23/2009</a:t>
             </a:fld>
             <a:endParaRPr lang="en-US"/>
           </a:p>
@@ -11537,11 +11533,7 @@
             <a:pPr lvl="1"/>
             <a:r>
               <a:rPr lang="en-US" dirty="0" smtClean="0"/>
-              <a:t>String </a:t>
-            </a:r>
-            <a:r>
-              <a:rPr lang="en-US" dirty="0" smtClean="0"/>
-              <a:t>parsing</a:t>
+              <a:t>String parsing</a:t>
             </a:r>
           </a:p>
           <a:p>
@@ -11550,7 +11542,6 @@
               <a:rPr lang="en-US" dirty="0" smtClean="0"/>
               <a:t>“Prayer-based parsing”</a:t>
             </a:r>
-            <a:endParaRPr lang="en-US" dirty="0" smtClean="0"/>
           </a:p>
           <a:p>
             <a:endParaRPr lang="en-US" dirty="0" smtClean="0"/>
@@ -13069,11 +13060,7 @@
             <a:pPr lvl="1"/>
             <a:r>
               <a:rPr lang="en-US" dirty="0" smtClean="0"/>
-              <a:t>Included in all server productions from 2009 </a:t>
-            </a:r>
-            <a:r>
-              <a:rPr lang="en-US" dirty="0" smtClean="0"/>
-              <a:t>forward</a:t>
+              <a:t>Included in all server productions from 2009 forward</a:t>
             </a:r>
           </a:p>
           <a:p>
@@ -13090,7 +13077,6 @@
               <a:rPr lang="en-US" dirty="0" smtClean="0"/>
               <a:t> (allows scripting anything)</a:t>
             </a:r>
-            <a:endParaRPr lang="en-US" dirty="0" smtClean="0"/>
           </a:p>
           <a:p>
             <a:pPr lvl="1"/>
@@ -13750,6 +13736,200 @@
           <a:p>
             <a:r>
               <a:rPr lang="en-US" dirty="0" smtClean="0"/>
+              <a:t>GUIs with </a:t>
+            </a:r>
+            <a:r>
+              <a:rPr lang="en-US" dirty="0" err="1" smtClean="0"/>
+              <a:t>PowerShell</a:t>
+            </a:r>
+            <a:endParaRPr lang="en-US" dirty="0"/>
+          </a:p>
+        </p:txBody>
+      </p:sp>
+      <p:sp>
+        <p:nvSpPr>
+          <p:cNvPr id="3" name="Content Placeholder 2"/>
+          <p:cNvSpPr>
+            <a:spLocks noGrp="1"/>
+          </p:cNvSpPr>
+          <p:nvPr>
+            <p:ph idx="1"/>
+          </p:nvPr>
+        </p:nvSpPr>
+        <p:spPr/>
+        <p:txBody>
+          <a:bodyPr/>
+          <a:lstStyle/>
+          <a:p>
+            <a:endParaRPr lang="en-US"/>
+          </a:p>
+        </p:txBody>
+      </p:sp>
+      <p:pic>
+        <p:nvPicPr>
+          <p:cNvPr id="1026" name="Picture 2"/>
+          <p:cNvPicPr>
+            <a:picLocks noChangeAspect="1" noChangeArrowheads="1"/>
+          </p:cNvPicPr>
+          <p:nvPr/>
+        </p:nvPicPr>
+        <p:blipFill>
+          <a:blip r:embed="rId2"/>
+          <a:srcRect/>
+          <a:stretch>
+            <a:fillRect/>
+          </a:stretch>
+        </p:blipFill>
+        <p:spPr bwMode="auto">
+          <a:xfrm>
+            <a:off x="457200" y="1600200"/>
+            <a:ext cx="5180504" cy="2667000"/>
+          </a:xfrm>
+          <a:prstGeom prst="rect">
+            <a:avLst/>
+          </a:prstGeom>
+          <a:noFill/>
+          <a:ln w="9525">
+            <a:noFill/>
+            <a:miter lim="800000"/>
+            <a:headEnd/>
+            <a:tailEnd/>
+          </a:ln>
+          <a:effectLst/>
+        </p:spPr>
+      </p:pic>
+      <p:pic>
+        <p:nvPicPr>
+          <p:cNvPr id="1027" name="Picture 3"/>
+          <p:cNvPicPr>
+            <a:picLocks noChangeAspect="1" noChangeArrowheads="1"/>
+          </p:cNvPicPr>
+          <p:nvPr/>
+        </p:nvPicPr>
+        <p:blipFill>
+          <a:blip r:embed="rId3"/>
+          <a:srcRect/>
+          <a:stretch>
+            <a:fillRect/>
+          </a:stretch>
+        </p:blipFill>
+        <p:spPr bwMode="auto">
+          <a:xfrm>
+            <a:off x="4648200" y="3505200"/>
+            <a:ext cx="3290207" cy="2657475"/>
+          </a:xfrm>
+          <a:prstGeom prst="rect">
+            <a:avLst/>
+          </a:prstGeom>
+          <a:noFill/>
+          <a:ln w="9525">
+            <a:noFill/>
+            <a:miter lim="800000"/>
+            <a:headEnd/>
+            <a:tailEnd/>
+          </a:ln>
+          <a:effectLst/>
+        </p:spPr>
+      </p:pic>
+      <p:sp>
+        <p:nvSpPr>
+          <p:cNvPr id="6" name="TextBox 5"/>
+          <p:cNvSpPr txBox="1"/>
+          <p:nvPr/>
+        </p:nvSpPr>
+        <p:spPr>
+          <a:xfrm>
+            <a:off x="457200" y="5029200"/>
+            <a:ext cx="3962400" cy="1200329"/>
+          </a:xfrm>
+          <a:prstGeom prst="rect">
+            <a:avLst/>
+          </a:prstGeom>
+          <a:noFill/>
+        </p:spPr>
+        <p:txBody>
+          <a:bodyPr wrap="square" rtlCol="0">
+            <a:spAutoFit/>
+          </a:bodyPr>
+          <a:lstStyle/>
+          <a:p>
+            <a:r>
+              <a:rPr lang="en-US" dirty="0" err="1" smtClean="0"/>
+              <a:t>PowerBoots</a:t>
+            </a:r>
+            <a:r>
+              <a:rPr lang="en-US" dirty="0" smtClean="0"/>
+              <a:t> from Joel Bennett</a:t>
+            </a:r>
+          </a:p>
+          <a:p>
+            <a:endParaRPr lang="en-US" dirty="0" smtClean="0"/>
+          </a:p>
+          <a:p>
+            <a:r>
+              <a:rPr lang="en-US" dirty="0" smtClean="0">
+                <a:hlinkClick r:id="rId4"/>
+              </a:rPr>
+              <a:t>http</a:t>
+            </a:r>
+            <a:r>
+              <a:rPr lang="en-US" dirty="0" smtClean="0">
+                <a:hlinkClick r:id="rId4"/>
+              </a:rPr>
+              <a:t>://huddledmasses.org/powerboots-tutorial-walkthrough</a:t>
+            </a:r>
+            <a:r>
+              <a:rPr lang="en-US" dirty="0" smtClean="0">
+                <a:hlinkClick r:id="rId4"/>
+              </a:rPr>
+              <a:t>/</a:t>
+            </a:r>
+            <a:endParaRPr lang="en-US" dirty="0"/>
+          </a:p>
+        </p:txBody>
+      </p:sp>
+    </p:spTree>
+  </p:cSld>
+  <p:clrMapOvr>
+    <a:masterClrMapping/>
+  </p:clrMapOvr>
+</p:sld>
+</file>
+
+<file path=ppt/slides/slide28.xml><?xml version="1.0" encoding="utf-8"?>
+<p:sld xmlns:a="http://schemas.openxmlformats.org/drawingml/2006/main" xmlns:r="http://schemas.openxmlformats.org/officeDocument/2006/relationships" xmlns:p="http://schemas.openxmlformats.org/presentationml/2006/main">
+  <p:cSld>
+    <p:spTree>
+      <p:nvGrpSpPr>
+        <p:cNvPr id="1" name=""/>
+        <p:cNvGrpSpPr/>
+        <p:nvPr/>
+      </p:nvGrpSpPr>
+      <p:grpSpPr>
+        <a:xfrm>
+          <a:off x="0" y="0"/>
+          <a:ext cx="0" cy="0"/>
+          <a:chOff x="0" y="0"/>
+          <a:chExt cx="0" cy="0"/>
+        </a:xfrm>
+      </p:grpSpPr>
+      <p:sp>
+        <p:nvSpPr>
+          <p:cNvPr id="2" name="Title 1"/>
+          <p:cNvSpPr>
+            <a:spLocks noGrp="1"/>
+          </p:cNvSpPr>
+          <p:nvPr>
+            <p:ph type="title"/>
+          </p:nvPr>
+        </p:nvSpPr>
+        <p:spPr/>
+        <p:txBody>
+          <a:bodyPr/>
+          <a:lstStyle/>
+          <a:p>
+            <a:r>
+              <a:rPr lang="en-US" dirty="0" smtClean="0"/>
               <a:t>What’s next for </a:t>
             </a:r>
             <a:r>
@@ -13855,7 +14035,7 @@
 </p:sld>
 </file>
 
-<file path=ppt/slides/slide28.xml><?xml version="1.0" encoding="utf-8"?>
+<file path=ppt/slides/slide29.xml><?xml version="1.0" encoding="utf-8"?>
 <p:sld xmlns:a="http://schemas.openxmlformats.org/drawingml/2006/main" xmlns:r="http://schemas.openxmlformats.org/officeDocument/2006/relationships" xmlns:p="http://schemas.openxmlformats.org/presentationml/2006/main">
   <p:cSld>
     <p:spTree>

</xml_diff>

<commit_message>
Added link to Jeff Atwood's post about the web browser address bar being the new command line.
</commit_message>
<xml_diff>
--- a/the-power-of-powershell/presentation.pptx
+++ b/the-power-of-powershell/presentation.pptx
@@ -224,7 +224,7 @@
             <a:fld id="{B9B93FB1-DF36-440F-A433-3E8F756D0415}" type="datetimeFigureOut">
               <a:rPr lang="en-US" smtClean="0"/>
               <a:pPr/>
-              <a:t>4/23/2009</a:t>
+              <a:t>5/17/2009</a:t>
             </a:fld>
             <a:endParaRPr lang="en-US"/>
           </a:p>
@@ -386,7 +386,7 @@
             <a:fld id="{C89EC058-892F-4F50-9EA1-1F3B0A11E872}" type="datetimeFigureOut">
               <a:rPr lang="en-US" smtClean="0"/>
               <a:pPr/>
-              <a:t>4/23/2009</a:t>
+              <a:t>5/17/2009</a:t>
             </a:fld>
             <a:endParaRPr lang="en-US"/>
           </a:p>
@@ -7159,7 +7159,7 @@
             <a:fld id="{85F33A90-6586-4AF8-955D-4A449BF70A77}" type="datetimeFigureOut">
               <a:rPr lang="en-US" smtClean="0"/>
               <a:pPr/>
-              <a:t>4/23/2009</a:t>
+              <a:t>5/17/2009</a:t>
             </a:fld>
             <a:endParaRPr lang="en-US"/>
           </a:p>
@@ -7217,7 +7217,7 @@
           <p:nvPr userDrawn="1"/>
         </p:nvPicPr>
         <p:blipFill>
-          <a:blip r:embed="rId2"/>
+          <a:blip r:embed="rId2" cstate="print"/>
           <a:stretch>
             <a:fillRect/>
           </a:stretch>
@@ -7350,7 +7350,7 @@
             <a:fld id="{85F33A90-6586-4AF8-955D-4A449BF70A77}" type="datetimeFigureOut">
               <a:rPr lang="en-US" smtClean="0"/>
               <a:pPr/>
-              <a:t>4/23/2009</a:t>
+              <a:t>5/17/2009</a:t>
             </a:fld>
             <a:endParaRPr lang="en-US"/>
           </a:p>
@@ -7527,7 +7527,7 @@
             <a:fld id="{85F33A90-6586-4AF8-955D-4A449BF70A77}" type="datetimeFigureOut">
               <a:rPr lang="en-US" smtClean="0"/>
               <a:pPr/>
-              <a:t>4/23/2009</a:t>
+              <a:t>5/17/2009</a:t>
             </a:fld>
             <a:endParaRPr lang="en-US"/>
           </a:p>
@@ -7698,7 +7698,7 @@
             <a:fld id="{85F33A90-6586-4AF8-955D-4A449BF70A77}" type="datetimeFigureOut">
               <a:rPr lang="en-US" smtClean="0"/>
               <a:pPr/>
-              <a:t>4/23/2009</a:t>
+              <a:t>5/17/2009</a:t>
             </a:fld>
             <a:endParaRPr lang="en-US"/>
           </a:p>
@@ -8155,7 +8155,7 @@
             <a:fld id="{85F33A90-6586-4AF8-955D-4A449BF70A77}" type="datetimeFigureOut">
               <a:rPr lang="en-US" smtClean="0"/>
               <a:pPr/>
-              <a:t>4/23/2009</a:t>
+              <a:t>5/17/2009</a:t>
             </a:fld>
             <a:endParaRPr lang="en-US"/>
           </a:p>
@@ -8213,7 +8213,7 @@
           <p:nvPr userDrawn="1"/>
         </p:nvPicPr>
         <p:blipFill>
-          <a:blip r:embed="rId2"/>
+          <a:blip r:embed="rId2" cstate="print"/>
           <a:stretch>
             <a:fillRect/>
           </a:stretch>
@@ -8445,7 +8445,7 @@
             <a:fld id="{85F33A90-6586-4AF8-955D-4A449BF70A77}" type="datetimeFigureOut">
               <a:rPr lang="en-US" smtClean="0"/>
               <a:pPr/>
-              <a:t>4/23/2009</a:t>
+              <a:t>5/17/2009</a:t>
             </a:fld>
             <a:endParaRPr lang="en-US"/>
           </a:p>
@@ -8821,7 +8821,7 @@
             <a:fld id="{85F33A90-6586-4AF8-955D-4A449BF70A77}" type="datetimeFigureOut">
               <a:rPr lang="en-US" smtClean="0"/>
               <a:pPr/>
-              <a:t>4/23/2009</a:t>
+              <a:t>5/17/2009</a:t>
             </a:fld>
             <a:endParaRPr lang="en-US"/>
           </a:p>
@@ -8879,7 +8879,7 @@
           <p:nvPr userDrawn="1"/>
         </p:nvPicPr>
         <p:blipFill>
-          <a:blip r:embed="rId2"/>
+          <a:blip r:embed="rId2" cstate="print"/>
           <a:stretch>
             <a:fillRect/>
           </a:stretch>
@@ -8969,7 +8969,7 @@
             <a:fld id="{85F33A90-6586-4AF8-955D-4A449BF70A77}" type="datetimeFigureOut">
               <a:rPr lang="en-US" smtClean="0"/>
               <a:pPr/>
-              <a:t>4/23/2009</a:t>
+              <a:t>5/17/2009</a:t>
             </a:fld>
             <a:endParaRPr lang="en-US"/>
           </a:p>
@@ -9061,7 +9061,7 @@
             <a:fld id="{85F33A90-6586-4AF8-955D-4A449BF70A77}" type="datetimeFigureOut">
               <a:rPr lang="en-US" smtClean="0"/>
               <a:pPr/>
-              <a:t>4/23/2009</a:t>
+              <a:t>5/17/2009</a:t>
             </a:fld>
             <a:endParaRPr lang="en-US"/>
           </a:p>
@@ -9312,7 +9312,7 @@
             <a:fld id="{85F33A90-6586-4AF8-955D-4A449BF70A77}" type="datetimeFigureOut">
               <a:rPr lang="en-US" smtClean="0"/>
               <a:pPr/>
-              <a:t>4/23/2009</a:t>
+              <a:t>5/17/2009</a:t>
             </a:fld>
             <a:endParaRPr lang="en-US"/>
           </a:p>
@@ -9573,7 +9573,7 @@
             <a:fld id="{85F33A90-6586-4AF8-955D-4A449BF70A77}" type="datetimeFigureOut">
               <a:rPr lang="en-US" smtClean="0"/>
               <a:pPr/>
-              <a:t>4/23/2009</a:t>
+              <a:t>5/17/2009</a:t>
             </a:fld>
             <a:endParaRPr lang="en-US"/>
           </a:p>
@@ -9631,7 +9631,7 @@
           <p:nvPr userDrawn="1"/>
         </p:nvPicPr>
         <p:blipFill>
-          <a:blip r:embed="rId2"/>
+          <a:blip r:embed="rId2" cstate="print"/>
           <a:stretch>
             <a:fillRect/>
           </a:stretch>
@@ -10003,7 +10003,7 @@
             <a:fld id="{85F33A90-6586-4AF8-955D-4A449BF70A77}" type="datetimeFigureOut">
               <a:rPr lang="en-US" smtClean="0"/>
               <a:pPr/>
-              <a:t>4/23/2009</a:t>
+              <a:t>5/17/2009</a:t>
             </a:fld>
             <a:endParaRPr lang="en-US"/>
           </a:p>
@@ -10097,7 +10097,7 @@
           <p:nvPr userDrawn="1"/>
         </p:nvPicPr>
         <p:blipFill>
-          <a:blip r:embed="rId13"/>
+          <a:blip r:embed="rId13" cstate="print"/>
           <a:stretch>
             <a:fillRect/>
           </a:stretch>
@@ -11398,7 +11398,7 @@
           <p:nvPr/>
         </p:nvPicPr>
         <p:blipFill>
-          <a:blip r:embed="rId3"/>
+          <a:blip r:embed="rId3" cstate="print"/>
           <a:srcRect/>
           <a:stretch>
             <a:fillRect/>
@@ -12745,7 +12745,7 @@
           <p:nvPr/>
         </p:nvPicPr>
         <p:blipFill>
-          <a:blip r:embed="rId4"/>
+          <a:blip r:embed="rId4" cstate="print"/>
           <a:srcRect/>
           <a:stretch>
             <a:fillRect/>
@@ -13201,7 +13201,7 @@
           </p:nvPr>
         </p:nvPicPr>
         <p:blipFill>
-          <a:blip r:embed="rId3"/>
+          <a:blip r:embed="rId3" cstate="print"/>
           <a:srcRect/>
           <a:stretch>
             <a:fillRect/>
@@ -13375,7 +13375,7 @@
           </p:nvPr>
         </p:nvPicPr>
         <p:blipFill>
-          <a:blip r:embed="rId3"/>
+          <a:blip r:embed="rId3" cstate="print"/>
           <a:stretch>
             <a:fillRect/>
           </a:stretch>
@@ -13774,7 +13774,7 @@
           <p:nvPr/>
         </p:nvPicPr>
         <p:blipFill>
-          <a:blip r:embed="rId2"/>
+          <a:blip r:embed="rId2" cstate="print"/>
           <a:srcRect/>
           <a:stretch>
             <a:fillRect/>
@@ -13807,7 +13807,7 @@
           <p:nvPr/>
         </p:nvPicPr>
         <p:blipFill>
-          <a:blip r:embed="rId3"/>
+          <a:blip r:embed="rId3" cstate="print"/>
           <a:srcRect/>
           <a:stretch>
             <a:fillRect/>
@@ -13870,19 +13870,7 @@
               <a:rPr lang="en-US" dirty="0" smtClean="0">
                 <a:hlinkClick r:id="rId4"/>
               </a:rPr>
-              <a:t>http</a:t>
-            </a:r>
-            <a:r>
-              <a:rPr lang="en-US" dirty="0" smtClean="0">
-                <a:hlinkClick r:id="rId4"/>
-              </a:rPr>
-              <a:t>://huddledmasses.org/powerboots-tutorial-walkthrough</a:t>
-            </a:r>
-            <a:r>
-              <a:rPr lang="en-US" dirty="0" smtClean="0">
-                <a:hlinkClick r:id="rId4"/>
-              </a:rPr>
-              <a:t>/</a:t>
+              <a:t>http://huddledmasses.org/powerboots-tutorial-walkthrough/</a:t>
             </a:r>
             <a:endParaRPr lang="en-US" dirty="0"/>
           </a:p>
@@ -14217,7 +14205,7 @@
           </p:nvPr>
         </p:nvPicPr>
         <p:blipFill>
-          <a:blip r:embed="rId2"/>
+          <a:blip r:embed="rId2" cstate="print"/>
           <a:stretch>
             <a:fillRect/>
           </a:stretch>
@@ -14658,7 +14646,7 @@
           <p:nvPr/>
         </p:nvPicPr>
         <p:blipFill>
-          <a:blip r:embed="rId2"/>
+          <a:blip r:embed="rId2" cstate="print"/>
           <a:srcRect/>
           <a:stretch>
             <a:fillRect/>
@@ -14777,7 +14765,7 @@
           <p:nvPr/>
         </p:nvPicPr>
         <p:blipFill>
-          <a:blip r:embed="rId3"/>
+          <a:blip r:embed="rId3" cstate="print"/>
           <a:stretch>
             <a:fillRect/>
           </a:stretch>
@@ -14867,7 +14855,7 @@
         </p:spPr>
         <p:txBody>
           <a:bodyPr>
-            <a:normAutofit fontScale="92500" lnSpcReduction="20000"/>
+            <a:normAutofit fontScale="77500" lnSpcReduction="20000"/>
           </a:bodyPr>
           <a:lstStyle/>
           <a:p>
@@ -14951,20 +14939,23 @@
           </a:p>
           <a:p>
             <a:r>
-              <a:rPr lang="en-US" dirty="0" err="1" smtClean="0">
+              <a:rPr lang="en-US" dirty="0" smtClean="0">
                 <a:hlinkClick r:id="rId6"/>
               </a:rPr>
-              <a:t>Launchy</a:t>
-            </a:r>
-            <a:r>
-              <a:rPr lang="en-US" dirty="0" smtClean="0"/>
-              <a:t>, </a:t>
-            </a:r>
+              <a:t>“The Web Browser Address Bar is the New Command Line”</a:t>
+            </a:r>
+            <a:r>
+              <a:rPr lang="en-US" dirty="0" smtClean="0"/>
+              <a:t> – Jeff Atwood</a:t>
+            </a:r>
+            <a:endParaRPr lang="en-US" dirty="0" smtClean="0"/>
+          </a:p>
+          <a:p>
             <a:r>
               <a:rPr lang="en-US" dirty="0" err="1" smtClean="0">
                 <a:hlinkClick r:id="rId7"/>
               </a:rPr>
-              <a:t>SlickRun</a:t>
+              <a:t>Launchy</a:t>
             </a:r>
             <a:r>
               <a:rPr lang="en-US" dirty="0" smtClean="0"/>
@@ -14974,6 +14965,16 @@
               <a:rPr lang="en-US" dirty="0" err="1" smtClean="0">
                 <a:hlinkClick r:id="rId8"/>
               </a:rPr>
+              <a:t>SlickRun</a:t>
+            </a:r>
+            <a:r>
+              <a:rPr lang="en-US" dirty="0" smtClean="0"/>
+              <a:t>, </a:t>
+            </a:r>
+            <a:r>
+              <a:rPr lang="en-US" dirty="0" err="1" smtClean="0">
+                <a:hlinkClick r:id="rId9"/>
+              </a:rPr>
               <a:t>QuickSilver</a:t>
             </a:r>
             <a:r>
@@ -14982,7 +14983,7 @@
             </a:r>
             <a:r>
               <a:rPr lang="en-US" dirty="0" smtClean="0">
-                <a:hlinkClick r:id="rId9"/>
+                <a:hlinkClick r:id="rId10"/>
               </a:rPr>
               <a:t>Gnome Do</a:t>
             </a:r>

</xml_diff>

<commit_message>
Getting set up for Little Rock and Conway talks.
Changed header in presentation. Added some resources. For PowerBoots
demo, pretty much scrapped it. PowerBoots SHIPS with better samples
now.
</commit_message>
<xml_diff>
--- a/the-power-of-powershell/presentation.pptx
+++ b/the-power-of-powershell/presentation.pptx
@@ -224,7 +224,7 @@
             <a:fld id="{B9B93FB1-DF36-440F-A433-3E8F756D0415}" type="datetimeFigureOut">
               <a:rPr lang="en-US" smtClean="0"/>
               <a:pPr/>
-              <a:t>5/17/2009</a:t>
+              <a:t>7/9/2009</a:t>
             </a:fld>
             <a:endParaRPr lang="en-US"/>
           </a:p>
@@ -386,7 +386,7 @@
             <a:fld id="{C89EC058-892F-4F50-9EA1-1F3B0A11E872}" type="datetimeFigureOut">
               <a:rPr lang="en-US" smtClean="0"/>
               <a:pPr/>
-              <a:t>5/17/2009</a:t>
+              <a:t>7/9/2009</a:t>
             </a:fld>
             <a:endParaRPr lang="en-US"/>
           </a:p>
@@ -7159,7 +7159,7 @@
             <a:fld id="{85F33A90-6586-4AF8-955D-4A449BF70A77}" type="datetimeFigureOut">
               <a:rPr lang="en-US" smtClean="0"/>
               <a:pPr/>
-              <a:t>5/17/2009</a:t>
+              <a:t>7/9/2009</a:t>
             </a:fld>
             <a:endParaRPr lang="en-US"/>
           </a:p>
@@ -7350,7 +7350,7 @@
             <a:fld id="{85F33A90-6586-4AF8-955D-4A449BF70A77}" type="datetimeFigureOut">
               <a:rPr lang="en-US" smtClean="0"/>
               <a:pPr/>
-              <a:t>5/17/2009</a:t>
+              <a:t>7/9/2009</a:t>
             </a:fld>
             <a:endParaRPr lang="en-US"/>
           </a:p>
@@ -7527,7 +7527,7 @@
             <a:fld id="{85F33A90-6586-4AF8-955D-4A449BF70A77}" type="datetimeFigureOut">
               <a:rPr lang="en-US" smtClean="0"/>
               <a:pPr/>
-              <a:t>5/17/2009</a:t>
+              <a:t>7/9/2009</a:t>
             </a:fld>
             <a:endParaRPr lang="en-US"/>
           </a:p>
@@ -7698,7 +7698,7 @@
             <a:fld id="{85F33A90-6586-4AF8-955D-4A449BF70A77}" type="datetimeFigureOut">
               <a:rPr lang="en-US" smtClean="0"/>
               <a:pPr/>
-              <a:t>5/17/2009</a:t>
+              <a:t>7/9/2009</a:t>
             </a:fld>
             <a:endParaRPr lang="en-US"/>
           </a:p>
@@ -8155,7 +8155,7 @@
             <a:fld id="{85F33A90-6586-4AF8-955D-4A449BF70A77}" type="datetimeFigureOut">
               <a:rPr lang="en-US" smtClean="0"/>
               <a:pPr/>
-              <a:t>5/17/2009</a:t>
+              <a:t>7/9/2009</a:t>
             </a:fld>
             <a:endParaRPr lang="en-US"/>
           </a:p>
@@ -8445,7 +8445,7 @@
             <a:fld id="{85F33A90-6586-4AF8-955D-4A449BF70A77}" type="datetimeFigureOut">
               <a:rPr lang="en-US" smtClean="0"/>
               <a:pPr/>
-              <a:t>5/17/2009</a:t>
+              <a:t>7/9/2009</a:t>
             </a:fld>
             <a:endParaRPr lang="en-US"/>
           </a:p>
@@ -8821,7 +8821,7 @@
             <a:fld id="{85F33A90-6586-4AF8-955D-4A449BF70A77}" type="datetimeFigureOut">
               <a:rPr lang="en-US" smtClean="0"/>
               <a:pPr/>
-              <a:t>5/17/2009</a:t>
+              <a:t>7/9/2009</a:t>
             </a:fld>
             <a:endParaRPr lang="en-US"/>
           </a:p>
@@ -8969,7 +8969,7 @@
             <a:fld id="{85F33A90-6586-4AF8-955D-4A449BF70A77}" type="datetimeFigureOut">
               <a:rPr lang="en-US" smtClean="0"/>
               <a:pPr/>
-              <a:t>5/17/2009</a:t>
+              <a:t>7/9/2009</a:t>
             </a:fld>
             <a:endParaRPr lang="en-US"/>
           </a:p>
@@ -9061,7 +9061,7 @@
             <a:fld id="{85F33A90-6586-4AF8-955D-4A449BF70A77}" type="datetimeFigureOut">
               <a:rPr lang="en-US" smtClean="0"/>
               <a:pPr/>
-              <a:t>5/17/2009</a:t>
+              <a:t>7/9/2009</a:t>
             </a:fld>
             <a:endParaRPr lang="en-US"/>
           </a:p>
@@ -9312,7 +9312,7 @@
             <a:fld id="{85F33A90-6586-4AF8-955D-4A449BF70A77}" type="datetimeFigureOut">
               <a:rPr lang="en-US" smtClean="0"/>
               <a:pPr/>
-              <a:t>5/17/2009</a:t>
+              <a:t>7/9/2009</a:t>
             </a:fld>
             <a:endParaRPr lang="en-US"/>
           </a:p>
@@ -9573,7 +9573,7 @@
             <a:fld id="{85F33A90-6586-4AF8-955D-4A449BF70A77}" type="datetimeFigureOut">
               <a:rPr lang="en-US" smtClean="0"/>
               <a:pPr/>
-              <a:t>5/17/2009</a:t>
+              <a:t>7/9/2009</a:t>
             </a:fld>
             <a:endParaRPr lang="en-US"/>
           </a:p>
@@ -10003,7 +10003,7 @@
             <a:fld id="{85F33A90-6586-4AF8-955D-4A449BF70A77}" type="datetimeFigureOut">
               <a:rPr lang="en-US" smtClean="0"/>
               <a:pPr/>
-              <a:t>5/17/2009</a:t>
+              <a:t>7/9/2009</a:t>
             </a:fld>
             <a:endParaRPr lang="en-US"/>
           </a:p>
@@ -10502,11 +10502,7 @@
             <a:pPr algn="r"/>
             <a:r>
               <a:rPr lang="en-US" dirty="0" smtClean="0"/>
-              <a:t>NWA </a:t>
-            </a:r>
-            <a:r>
-              <a:rPr lang="en-US" dirty="0" err="1" smtClean="0"/>
-              <a:t>CodeCamp</a:t>
+              <a:t>Little Rock DNUG</a:t>
             </a:r>
             <a:endParaRPr lang="en-US" dirty="0" smtClean="0"/>
           </a:p>
@@ -10514,7 +10510,11 @@
             <a:pPr algn="r"/>
             <a:r>
               <a:rPr lang="en-US" dirty="0" smtClean="0"/>
-              <a:t>April 25, 2009</a:t>
+              <a:t>July 13, </a:t>
+            </a:r>
+            <a:r>
+              <a:rPr lang="en-US" dirty="0" smtClean="0"/>
+              <a:t>2009</a:t>
             </a:r>
           </a:p>
           <a:p>
@@ -14948,7 +14948,6 @@
               <a:rPr lang="en-US" dirty="0" smtClean="0"/>
               <a:t> – Jeff Atwood</a:t>
             </a:r>
-            <a:endParaRPr lang="en-US" dirty="0" smtClean="0"/>
           </a:p>
           <a:p>
             <a:r>

</xml_diff>

<commit_message>
More prep for Little Rock and Conway presentations.
Added small job and remoting examples.
Added some more links to references.
Other minor tweaks.
</commit_message>
<xml_diff>
--- a/the-power-of-powershell/presentation.pptx
+++ b/the-power-of-powershell/presentation.pptx
@@ -5,10 +5,10 @@
     <p:sldMasterId id="2147483660" r:id="rId1"/>
   </p:sldMasterIdLst>
   <p:notesMasterIdLst>
-    <p:notesMasterId r:id="rId31"/>
+    <p:notesMasterId r:id="rId32"/>
   </p:notesMasterIdLst>
   <p:handoutMasterIdLst>
-    <p:handoutMasterId r:id="rId32"/>
+    <p:handoutMasterId r:id="rId33"/>
   </p:handoutMasterIdLst>
   <p:sldIdLst>
     <p:sldId id="256" r:id="rId2"/>
@@ -38,8 +38,9 @@
     <p:sldId id="286" r:id="rId26"/>
     <p:sldId id="287" r:id="rId27"/>
     <p:sldId id="288" r:id="rId28"/>
-    <p:sldId id="279" r:id="rId29"/>
-    <p:sldId id="284" r:id="rId30"/>
+    <p:sldId id="289" r:id="rId29"/>
+    <p:sldId id="279" r:id="rId30"/>
+    <p:sldId id="284" r:id="rId31"/>
   </p:sldIdLst>
   <p:sldSz cx="9144000" cy="6858000" type="screen4x3"/>
   <p:notesSz cx="6858000" cy="9144000"/>
@@ -224,7 +225,7 @@
             <a:fld id="{B9B93FB1-DF36-440F-A433-3E8F756D0415}" type="datetimeFigureOut">
               <a:rPr lang="en-US" smtClean="0"/>
               <a:pPr/>
-              <a:t>7/9/2009</a:t>
+              <a:t>7/12/2009</a:t>
             </a:fld>
             <a:endParaRPr lang="en-US"/>
           </a:p>
@@ -386,7 +387,7 @@
             <a:fld id="{C89EC058-892F-4F50-9EA1-1F3B0A11E872}" type="datetimeFigureOut">
               <a:rPr lang="en-US" smtClean="0"/>
               <a:pPr/>
-              <a:t>7/9/2009</a:t>
+              <a:t>7/12/2009</a:t>
             </a:fld>
             <a:endParaRPr lang="en-US"/>
           </a:p>
@@ -4632,32 +4633,11 @@
           <a:p>
             <a:r>
               <a:rPr lang="en-US" dirty="0" smtClean="0"/>
-              <a:t>&lt;demo from 2K8 VM&gt;</a:t>
-            </a:r>
-          </a:p>
-          <a:p>
-            <a:endParaRPr lang="en-US" dirty="0" smtClean="0"/>
-          </a:p>
-          <a:p>
-            <a:r>
-              <a:rPr lang="en-US" dirty="0" err="1" smtClean="0"/>
-              <a:t>PowerShell</a:t>
-            </a:r>
-            <a:r>
-              <a:rPr lang="en-US" dirty="0" smtClean="0"/>
-              <a:t> as a version 1 product has already become</a:t>
-            </a:r>
-            <a:r>
-              <a:rPr lang="en-US" baseline="0" dirty="0" smtClean="0"/>
-              <a:t> highly impressive. Historically, version 1 releases of Microsoft tools have been… well… iffy, maybe? But </a:t>
-            </a:r>
-            <a:r>
-              <a:rPr lang="en-US" baseline="0" dirty="0" err="1" smtClean="0"/>
-              <a:t>PowerShell</a:t>
-            </a:r>
-            <a:r>
-              <a:rPr lang="en-US" baseline="0" dirty="0" smtClean="0"/>
-              <a:t> is doing great and I think it will continue to improve.</a:t>
+              <a:t>See</a:t>
+            </a:r>
+            <a:r>
+              <a:rPr lang="en-US" baseline="0" dirty="0" smtClean="0"/>
+              <a:t> PowerBoots-Demo.ps1</a:t>
             </a:r>
             <a:endParaRPr lang="en-US" dirty="0"/>
           </a:p>
@@ -4681,7 +4661,118 @@
             <a:fld id="{5FD7F0AD-5F3B-4E9C-B332-A6DF54A738BE}" type="slidenum">
               <a:rPr lang="en-US" smtClean="0"/>
               <a:pPr/>
-              <a:t>28</a:t>
+              <a:t>27</a:t>
+            </a:fld>
+            <a:endParaRPr lang="en-US"/>
+          </a:p>
+        </p:txBody>
+      </p:sp>
+    </p:spTree>
+  </p:cSld>
+  <p:clrMapOvr>
+    <a:masterClrMapping/>
+  </p:clrMapOvr>
+</p:notes>
+</file>
+
+<file path=ppt/notesSlides/notesSlide21.xml><?xml version="1.0" encoding="utf-8"?>
+<p:notes xmlns:a="http://schemas.openxmlformats.org/drawingml/2006/main" xmlns:r="http://schemas.openxmlformats.org/officeDocument/2006/relationships" xmlns:p="http://schemas.openxmlformats.org/presentationml/2006/main">
+  <p:cSld>
+    <p:spTree>
+      <p:nvGrpSpPr>
+        <p:cNvPr id="1" name=""/>
+        <p:cNvGrpSpPr/>
+        <p:nvPr/>
+      </p:nvGrpSpPr>
+      <p:grpSpPr>
+        <a:xfrm>
+          <a:off x="0" y="0"/>
+          <a:ext cx="0" cy="0"/>
+          <a:chOff x="0" y="0"/>
+          <a:chExt cx="0" cy="0"/>
+        </a:xfrm>
+      </p:grpSpPr>
+      <p:sp>
+        <p:nvSpPr>
+          <p:cNvPr id="2" name="Slide Image Placeholder 1"/>
+          <p:cNvSpPr>
+            <a:spLocks noGrp="1" noRot="1" noChangeAspect="1"/>
+          </p:cNvSpPr>
+          <p:nvPr>
+            <p:ph type="sldImg"/>
+          </p:nvPr>
+        </p:nvSpPr>
+        <p:spPr/>
+      </p:sp>
+      <p:sp>
+        <p:nvSpPr>
+          <p:cNvPr id="3" name="Notes Placeholder 2"/>
+          <p:cNvSpPr>
+            <a:spLocks noGrp="1"/>
+          </p:cNvSpPr>
+          <p:nvPr>
+            <p:ph type="body" idx="1"/>
+          </p:nvPr>
+        </p:nvSpPr>
+        <p:spPr/>
+        <p:txBody>
+          <a:bodyPr>
+            <a:normAutofit/>
+          </a:bodyPr>
+          <a:lstStyle/>
+          <a:p>
+            <a:r>
+              <a:rPr lang="en-US" dirty="0" smtClean="0"/>
+              <a:t>&lt;demo from 2K8 VM&gt;</a:t>
+            </a:r>
+          </a:p>
+          <a:p>
+            <a:endParaRPr lang="en-US" dirty="0" smtClean="0"/>
+          </a:p>
+          <a:p>
+            <a:r>
+              <a:rPr lang="en-US" dirty="0" err="1" smtClean="0"/>
+              <a:t>PowerShell</a:t>
+            </a:r>
+            <a:r>
+              <a:rPr lang="en-US" dirty="0" smtClean="0"/>
+              <a:t> as a version 1 product has already become</a:t>
+            </a:r>
+            <a:r>
+              <a:rPr lang="en-US" baseline="0" dirty="0" smtClean="0"/>
+              <a:t> highly impressive. Historically, version 1 releases of Microsoft tools have been… well… iffy, maybe? But </a:t>
+            </a:r>
+            <a:r>
+              <a:rPr lang="en-US" baseline="0" dirty="0" err="1" smtClean="0"/>
+              <a:t>PowerShell</a:t>
+            </a:r>
+            <a:r>
+              <a:rPr lang="en-US" baseline="0" dirty="0" smtClean="0"/>
+              <a:t> is doing great and I think it will continue to improve.</a:t>
+            </a:r>
+            <a:endParaRPr lang="en-US" dirty="0"/>
+          </a:p>
+        </p:txBody>
+      </p:sp>
+      <p:sp>
+        <p:nvSpPr>
+          <p:cNvPr id="4" name="Slide Number Placeholder 3"/>
+          <p:cNvSpPr>
+            <a:spLocks noGrp="1"/>
+          </p:cNvSpPr>
+          <p:nvPr>
+            <p:ph type="sldNum" sz="quarter" idx="10"/>
+          </p:nvPr>
+        </p:nvSpPr>
+        <p:spPr/>
+        <p:txBody>
+          <a:bodyPr/>
+          <a:lstStyle/>
+          <a:p>
+            <a:fld id="{5FD7F0AD-5F3B-4E9C-B332-A6DF54A738BE}" type="slidenum">
+              <a:rPr lang="en-US" smtClean="0"/>
+              <a:pPr/>
+              <a:t>29</a:t>
             </a:fld>
             <a:endParaRPr lang="en-US"/>
           </a:p>
@@ -7159,7 +7250,7 @@
             <a:fld id="{85F33A90-6586-4AF8-955D-4A449BF70A77}" type="datetimeFigureOut">
               <a:rPr lang="en-US" smtClean="0"/>
               <a:pPr/>
-              <a:t>7/9/2009</a:t>
+              <a:t>7/12/2009</a:t>
             </a:fld>
             <a:endParaRPr lang="en-US"/>
           </a:p>
@@ -7350,7 +7441,7 @@
             <a:fld id="{85F33A90-6586-4AF8-955D-4A449BF70A77}" type="datetimeFigureOut">
               <a:rPr lang="en-US" smtClean="0"/>
               <a:pPr/>
-              <a:t>7/9/2009</a:t>
+              <a:t>7/12/2009</a:t>
             </a:fld>
             <a:endParaRPr lang="en-US"/>
           </a:p>
@@ -7527,7 +7618,7 @@
             <a:fld id="{85F33A90-6586-4AF8-955D-4A449BF70A77}" type="datetimeFigureOut">
               <a:rPr lang="en-US" smtClean="0"/>
               <a:pPr/>
-              <a:t>7/9/2009</a:t>
+              <a:t>7/12/2009</a:t>
             </a:fld>
             <a:endParaRPr lang="en-US"/>
           </a:p>
@@ -7698,7 +7789,7 @@
             <a:fld id="{85F33A90-6586-4AF8-955D-4A449BF70A77}" type="datetimeFigureOut">
               <a:rPr lang="en-US" smtClean="0"/>
               <a:pPr/>
-              <a:t>7/9/2009</a:t>
+              <a:t>7/12/2009</a:t>
             </a:fld>
             <a:endParaRPr lang="en-US"/>
           </a:p>
@@ -8155,7 +8246,7 @@
             <a:fld id="{85F33A90-6586-4AF8-955D-4A449BF70A77}" type="datetimeFigureOut">
               <a:rPr lang="en-US" smtClean="0"/>
               <a:pPr/>
-              <a:t>7/9/2009</a:t>
+              <a:t>7/12/2009</a:t>
             </a:fld>
             <a:endParaRPr lang="en-US"/>
           </a:p>
@@ -8445,7 +8536,7 @@
             <a:fld id="{85F33A90-6586-4AF8-955D-4A449BF70A77}" type="datetimeFigureOut">
               <a:rPr lang="en-US" smtClean="0"/>
               <a:pPr/>
-              <a:t>7/9/2009</a:t>
+              <a:t>7/12/2009</a:t>
             </a:fld>
             <a:endParaRPr lang="en-US"/>
           </a:p>
@@ -8821,7 +8912,7 @@
             <a:fld id="{85F33A90-6586-4AF8-955D-4A449BF70A77}" type="datetimeFigureOut">
               <a:rPr lang="en-US" smtClean="0"/>
               <a:pPr/>
-              <a:t>7/9/2009</a:t>
+              <a:t>7/12/2009</a:t>
             </a:fld>
             <a:endParaRPr lang="en-US"/>
           </a:p>
@@ -8969,7 +9060,7 @@
             <a:fld id="{85F33A90-6586-4AF8-955D-4A449BF70A77}" type="datetimeFigureOut">
               <a:rPr lang="en-US" smtClean="0"/>
               <a:pPr/>
-              <a:t>7/9/2009</a:t>
+              <a:t>7/12/2009</a:t>
             </a:fld>
             <a:endParaRPr lang="en-US"/>
           </a:p>
@@ -9061,7 +9152,7 @@
             <a:fld id="{85F33A90-6586-4AF8-955D-4A449BF70A77}" type="datetimeFigureOut">
               <a:rPr lang="en-US" smtClean="0"/>
               <a:pPr/>
-              <a:t>7/9/2009</a:t>
+              <a:t>7/12/2009</a:t>
             </a:fld>
             <a:endParaRPr lang="en-US"/>
           </a:p>
@@ -9312,7 +9403,7 @@
             <a:fld id="{85F33A90-6586-4AF8-955D-4A449BF70A77}" type="datetimeFigureOut">
               <a:rPr lang="en-US" smtClean="0"/>
               <a:pPr/>
-              <a:t>7/9/2009</a:t>
+              <a:t>7/12/2009</a:t>
             </a:fld>
             <a:endParaRPr lang="en-US"/>
           </a:p>
@@ -9573,7 +9664,7 @@
             <a:fld id="{85F33A90-6586-4AF8-955D-4A449BF70A77}" type="datetimeFigureOut">
               <a:rPr lang="en-US" smtClean="0"/>
               <a:pPr/>
-              <a:t>7/9/2009</a:t>
+              <a:t>7/12/2009</a:t>
             </a:fld>
             <a:endParaRPr lang="en-US"/>
           </a:p>
@@ -10003,7 +10094,7 @@
             <a:fld id="{85F33A90-6586-4AF8-955D-4A449BF70A77}" type="datetimeFigureOut">
               <a:rPr lang="en-US" smtClean="0"/>
               <a:pPr/>
-              <a:t>7/9/2009</a:t>
+              <a:t>7/12/2009</a:t>
             </a:fld>
             <a:endParaRPr lang="en-US"/>
           </a:p>
@@ -10504,17 +10595,12 @@
               <a:rPr lang="en-US" dirty="0" smtClean="0"/>
               <a:t>Little Rock DNUG</a:t>
             </a:r>
-            <a:endParaRPr lang="en-US" dirty="0" smtClean="0"/>
           </a:p>
           <a:p>
             <a:pPr algn="r"/>
             <a:r>
               <a:rPr lang="en-US" dirty="0" smtClean="0"/>
-              <a:t>July 13, </a:t>
-            </a:r>
-            <a:r>
-              <a:rPr lang="en-US" dirty="0" smtClean="0"/>
-              <a:t>2009</a:t>
+              <a:t>July 13, 2009</a:t>
             </a:r>
           </a:p>
           <a:p>
@@ -13774,7 +13860,7 @@
           <p:nvPr/>
         </p:nvPicPr>
         <p:blipFill>
-          <a:blip r:embed="rId2" cstate="print"/>
+          <a:blip r:embed="rId3" cstate="print"/>
           <a:srcRect/>
           <a:stretch>
             <a:fillRect/>
@@ -13807,7 +13893,7 @@
           <p:nvPr/>
         </p:nvPicPr>
         <p:blipFill>
-          <a:blip r:embed="rId3" cstate="print"/>
+          <a:blip r:embed="rId4" cstate="print"/>
           <a:srcRect/>
           <a:stretch>
             <a:fillRect/>
@@ -13868,7 +13954,7 @@
           <a:p>
             <a:r>
               <a:rPr lang="en-US" dirty="0" smtClean="0">
-                <a:hlinkClick r:id="rId4"/>
+                <a:hlinkClick r:id="rId5"/>
               </a:rPr>
               <a:t>http://huddledmasses.org/powerboots-tutorial-walkthrough/</a:t>
             </a:r>
@@ -13918,15 +14004,7 @@
           <a:p>
             <a:r>
               <a:rPr lang="en-US" dirty="0" smtClean="0"/>
-              <a:t>What’s next for </a:t>
-            </a:r>
-            <a:r>
-              <a:rPr lang="en-US" dirty="0" err="1" smtClean="0"/>
-              <a:t>PowerShell</a:t>
-            </a:r>
-            <a:r>
-              <a:rPr lang="en-US" dirty="0" smtClean="0"/>
-              <a:t>?</a:t>
+              <a:t>Find stuff quickly!</a:t>
             </a:r>
             <a:endParaRPr lang="en-US" dirty="0"/>
           </a:p>
@@ -13934,7 +14012,7 @@
       </p:sp>
       <p:sp>
         <p:nvSpPr>
-          <p:cNvPr id="3" name="Content Placeholder 2"/>
+          <p:cNvPr id="5" name="Content Placeholder 4"/>
           <p:cNvSpPr>
             <a:spLocks noGrp="1"/>
           </p:cNvSpPr>
@@ -13947,62 +14025,118 @@
           <a:bodyPr/>
           <a:lstStyle/>
           <a:p>
+            <a:endParaRPr lang="en-US" dirty="0" smtClean="0"/>
+          </a:p>
+          <a:p>
+            <a:endParaRPr lang="en-US" dirty="0" smtClean="0"/>
+          </a:p>
+          <a:p>
+            <a:endParaRPr lang="en-US" dirty="0" smtClean="0"/>
+          </a:p>
+          <a:p>
+            <a:endParaRPr lang="en-US" dirty="0" smtClean="0"/>
+          </a:p>
+          <a:p>
+            <a:endParaRPr lang="en-US" dirty="0" smtClean="0"/>
+          </a:p>
+          <a:p>
+            <a:endParaRPr lang="en-US" dirty="0" smtClean="0"/>
+          </a:p>
+          <a:p>
+            <a:endParaRPr lang="en-US" dirty="0"/>
+          </a:p>
+        </p:txBody>
+      </p:sp>
+      <p:pic>
+        <p:nvPicPr>
+          <p:cNvPr id="1027" name="Picture 3"/>
+          <p:cNvPicPr>
+            <a:picLocks noChangeAspect="1" noChangeArrowheads="1"/>
+          </p:cNvPicPr>
+          <p:nvPr/>
+        </p:nvPicPr>
+        <p:blipFill>
+          <a:blip r:embed="rId2" cstate="print"/>
+          <a:srcRect/>
+          <a:stretch>
+            <a:fillRect/>
+          </a:stretch>
+        </p:blipFill>
+        <p:spPr bwMode="auto">
+          <a:xfrm>
+            <a:off x="457200" y="1524000"/>
+            <a:ext cx="8336507" cy="3048000"/>
+          </a:xfrm>
+          <a:prstGeom prst="rect">
+            <a:avLst/>
+          </a:prstGeom>
+          <a:noFill/>
+          <a:ln w="9525">
+            <a:noFill/>
+            <a:miter lim="800000"/>
+            <a:headEnd/>
+            <a:tailEnd/>
+          </a:ln>
+        </p:spPr>
+      </p:pic>
+      <p:sp>
+        <p:nvSpPr>
+          <p:cNvPr id="7" name="TextBox 6"/>
+          <p:cNvSpPr txBox="1"/>
+          <p:nvPr/>
+        </p:nvSpPr>
+        <p:spPr>
+          <a:xfrm>
+            <a:off x="533400" y="4953000"/>
+            <a:ext cx="8229600" cy="1477328"/>
+          </a:xfrm>
+          <a:prstGeom prst="rect">
+            <a:avLst/>
+          </a:prstGeom>
+          <a:noFill/>
+        </p:spPr>
+        <p:txBody>
+          <a:bodyPr wrap="square" rtlCol="0">
+            <a:spAutoFit/>
+          </a:bodyPr>
+          <a:lstStyle/>
+          <a:p>
+            <a:r>
+              <a:rPr lang="en-US" dirty="0" smtClean="0"/>
+              <a:t>Find-String.ps1</a:t>
+            </a:r>
+          </a:p>
+          <a:p>
+            <a:endParaRPr lang="en-US" dirty="0" smtClean="0"/>
+          </a:p>
+          <a:p>
+            <a:r>
+              <a:rPr lang="en-US" dirty="0" smtClean="0"/>
+              <a:t>Output based on </a:t>
+            </a:r>
             <a:r>
               <a:rPr lang="en-US" dirty="0" err="1" smtClean="0">
                 <a:hlinkClick r:id="rId3"/>
               </a:rPr>
-              <a:t>PowerShell</a:t>
-            </a:r>
+              <a:t>ack</a:t>
+            </a:r>
+            <a:endParaRPr lang="en-US" dirty="0" smtClean="0"/>
+          </a:p>
+          <a:p>
+            <a:endParaRPr lang="en-US" dirty="0" smtClean="0"/>
+          </a:p>
+          <a:p>
             <a:r>
               <a:rPr lang="en-US" dirty="0" smtClean="0">
-                <a:hlinkClick r:id="rId3"/>
+                <a:hlinkClick r:id="rId4"/>
               </a:rPr>
-              <a:t> V2 CTP3 is out</a:t>
-            </a:r>
-            <a:endParaRPr lang="en-US" dirty="0" smtClean="0"/>
-          </a:p>
-          <a:p>
-            <a:r>
-              <a:rPr lang="en-US" dirty="0" smtClean="0"/>
-              <a:t>Version 2 is considered feature complete</a:t>
-            </a:r>
-          </a:p>
-          <a:p>
-            <a:r>
-              <a:rPr lang="en-US" dirty="0" smtClean="0"/>
-              <a:t>Some features:</a:t>
-            </a:r>
-          </a:p>
-          <a:p>
-            <a:pPr lvl="1"/>
-            <a:r>
-              <a:rPr lang="en-US" dirty="0" err="1" smtClean="0"/>
-              <a:t>Remoting</a:t>
-            </a:r>
-            <a:r>
-              <a:rPr lang="en-US" dirty="0" smtClean="0"/>
-              <a:t> support</a:t>
-            </a:r>
-          </a:p>
-          <a:p>
-            <a:pPr lvl="1"/>
-            <a:r>
-              <a:rPr lang="en-US" dirty="0" smtClean="0"/>
-              <a:t>Job support</a:t>
-            </a:r>
-          </a:p>
-          <a:p>
-            <a:pPr lvl="1"/>
-            <a:r>
-              <a:rPr lang="en-US" dirty="0" smtClean="0"/>
-              <a:t>Graphical Console</a:t>
-            </a:r>
-          </a:p>
-          <a:p>
-            <a:pPr lvl="1"/>
-            <a:r>
-              <a:rPr lang="en-US" dirty="0" smtClean="0"/>
-              <a:t>Transactions</a:t>
+              <a:t>http://</a:t>
+            </a:r>
+            <a:r>
+              <a:rPr lang="en-US" dirty="0" smtClean="0">
+                <a:hlinkClick r:id="rId4"/>
+              </a:rPr>
+              <a:t>github.com/drmohundro/Find-String/tree/master</a:t>
             </a:r>
             <a:endParaRPr lang="en-US" dirty="0"/>
           </a:p>
@@ -14013,13 +14147,6 @@
   <p:clrMapOvr>
     <a:masterClrMapping/>
   </p:clrMapOvr>
-  <p:timing>
-    <p:tnLst>
-      <p:par>
-        <p:cTn id="1" dur="indefinite" restart="never" nodeType="tmRoot"/>
-      </p:par>
-    </p:tnLst>
-  </p:timing>
 </p:sld>
 </file>
 
@@ -14057,7 +14184,15 @@
           <a:p>
             <a:r>
               <a:rPr lang="en-US" dirty="0" smtClean="0"/>
-              <a:t>Questions?</a:t>
+              <a:t>What’s next for </a:t>
+            </a:r>
+            <a:r>
+              <a:rPr lang="en-US" dirty="0" err="1" smtClean="0"/>
+              <a:t>PowerShell</a:t>
+            </a:r>
+            <a:r>
+              <a:rPr lang="en-US" dirty="0" smtClean="0"/>
+              <a:t>?</a:t>
             </a:r>
             <a:endParaRPr lang="en-US" dirty="0"/>
           </a:p>
@@ -14078,54 +14213,78 @@
           <a:bodyPr/>
           <a:lstStyle/>
           <a:p>
-            <a:pPr algn="r">
-              <a:buNone/>
-            </a:pPr>
-            <a:endParaRPr lang="en-US" dirty="0" smtClean="0"/>
-          </a:p>
-          <a:p>
-            <a:pPr algn="r">
-              <a:buNone/>
-            </a:pPr>
-            <a:endParaRPr lang="en-US" dirty="0" smtClean="0"/>
-          </a:p>
-          <a:p>
-            <a:pPr algn="r">
-              <a:buNone/>
-            </a:pPr>
-            <a:r>
-              <a:rPr lang="en-US" dirty="0" smtClean="0"/>
-              <a:t>David </a:t>
-            </a:r>
-            <a:r>
-              <a:rPr lang="en-US" dirty="0" err="1" smtClean="0"/>
-              <a:t>Mohundro</a:t>
-            </a:r>
-            <a:endParaRPr lang="en-US" dirty="0" smtClean="0"/>
-          </a:p>
-          <a:p>
-            <a:pPr algn="r">
-              <a:buNone/>
-            </a:pPr>
-            <a:r>
-              <a:rPr lang="en-US" dirty="0" smtClean="0">
-                <a:hlinkClick r:id="rId2"/>
+            <a:r>
+              <a:rPr lang="en-US" dirty="0" err="1" smtClean="0">
+                <a:hlinkClick r:id="rId3"/>
               </a:rPr>
-              <a:t>http://www.mohundro.com/blog/</a:t>
-            </a:r>
-            <a:endParaRPr lang="en-US" dirty="0" smtClean="0"/>
-          </a:p>
-          <a:p>
-            <a:pPr algn="r">
-              <a:buNone/>
-            </a:pPr>
+              <a:t>PowerShell</a:t>
+            </a:r>
             <a:r>
               <a:rPr lang="en-US" dirty="0" smtClean="0">
                 <a:hlinkClick r:id="rId3"/>
               </a:rPr>
-              <a:t>http://twitter.com/drmohundro</a:t>
+              <a:t> V2 CTP3 is out</a:t>
             </a:r>
             <a:endParaRPr lang="en-US" dirty="0" smtClean="0"/>
+          </a:p>
+          <a:p>
+            <a:r>
+              <a:rPr lang="en-US" dirty="0" smtClean="0"/>
+              <a:t>Version 2 is considered feature complete</a:t>
+            </a:r>
+          </a:p>
+          <a:p>
+            <a:r>
+              <a:rPr lang="en-US" dirty="0" smtClean="0"/>
+              <a:t>Some features:</a:t>
+            </a:r>
+          </a:p>
+          <a:p>
+            <a:pPr lvl="1"/>
+            <a:r>
+              <a:rPr lang="en-US" dirty="0" err="1" smtClean="0"/>
+              <a:t>Remoting</a:t>
+            </a:r>
+            <a:r>
+              <a:rPr lang="en-US" dirty="0" smtClean="0"/>
+              <a:t> </a:t>
+            </a:r>
+            <a:r>
+              <a:rPr lang="en-US" dirty="0" smtClean="0"/>
+              <a:t>support (</a:t>
+            </a:r>
+            <a:r>
+              <a:rPr lang="en-US" smtClean="0"/>
+              <a:t>see remoting-demo.txt)</a:t>
+            </a:r>
+            <a:endParaRPr lang="en-US" dirty="0" smtClean="0"/>
+          </a:p>
+          <a:p>
+            <a:pPr lvl="1"/>
+            <a:r>
+              <a:rPr lang="en-US" dirty="0" smtClean="0"/>
+              <a:t>Job </a:t>
+            </a:r>
+            <a:r>
+              <a:rPr lang="en-US" dirty="0" smtClean="0"/>
+              <a:t>support (see job-demo.txt)</a:t>
+            </a:r>
+            <a:endParaRPr lang="en-US" dirty="0" smtClean="0"/>
+          </a:p>
+          <a:p>
+            <a:pPr lvl="1"/>
+            <a:r>
+              <a:rPr lang="en-US" dirty="0" smtClean="0"/>
+              <a:t>Graphical Console</a:t>
+            </a:r>
+          </a:p>
+          <a:p>
+            <a:pPr lvl="1"/>
+            <a:r>
+              <a:rPr lang="en-US" dirty="0" smtClean="0"/>
+              <a:t>Transactions</a:t>
+            </a:r>
+            <a:endParaRPr lang="en-US" dirty="0"/>
           </a:p>
         </p:txBody>
       </p:sp>
@@ -14273,6 +14432,127 @@
               <a:t>”</a:t>
             </a:r>
             <a:endParaRPr lang="en-US" dirty="0"/>
+          </a:p>
+        </p:txBody>
+      </p:sp>
+    </p:spTree>
+  </p:cSld>
+  <p:clrMapOvr>
+    <a:masterClrMapping/>
+  </p:clrMapOvr>
+  <p:timing>
+    <p:tnLst>
+      <p:par>
+        <p:cTn id="1" dur="indefinite" restart="never" nodeType="tmRoot"/>
+      </p:par>
+    </p:tnLst>
+  </p:timing>
+</p:sld>
+</file>
+
+<file path=ppt/slides/slide30.xml><?xml version="1.0" encoding="utf-8"?>
+<p:sld xmlns:a="http://schemas.openxmlformats.org/drawingml/2006/main" xmlns:r="http://schemas.openxmlformats.org/officeDocument/2006/relationships" xmlns:p="http://schemas.openxmlformats.org/presentationml/2006/main">
+  <p:cSld>
+    <p:spTree>
+      <p:nvGrpSpPr>
+        <p:cNvPr id="1" name=""/>
+        <p:cNvGrpSpPr/>
+        <p:nvPr/>
+      </p:nvGrpSpPr>
+      <p:grpSpPr>
+        <a:xfrm>
+          <a:off x="0" y="0"/>
+          <a:ext cx="0" cy="0"/>
+          <a:chOff x="0" y="0"/>
+          <a:chExt cx="0" cy="0"/>
+        </a:xfrm>
+      </p:grpSpPr>
+      <p:sp>
+        <p:nvSpPr>
+          <p:cNvPr id="2" name="Title 1"/>
+          <p:cNvSpPr>
+            <a:spLocks noGrp="1"/>
+          </p:cNvSpPr>
+          <p:nvPr>
+            <p:ph type="title"/>
+          </p:nvPr>
+        </p:nvSpPr>
+        <p:spPr/>
+        <p:txBody>
+          <a:bodyPr/>
+          <a:lstStyle/>
+          <a:p>
+            <a:r>
+              <a:rPr lang="en-US" dirty="0" smtClean="0"/>
+              <a:t>Questions?</a:t>
+            </a:r>
+            <a:endParaRPr lang="en-US" dirty="0"/>
+          </a:p>
+        </p:txBody>
+      </p:sp>
+      <p:sp>
+        <p:nvSpPr>
+          <p:cNvPr id="3" name="Content Placeholder 2"/>
+          <p:cNvSpPr>
+            <a:spLocks noGrp="1"/>
+          </p:cNvSpPr>
+          <p:nvPr>
+            <p:ph idx="1"/>
+          </p:nvPr>
+        </p:nvSpPr>
+        <p:spPr/>
+        <p:txBody>
+          <a:bodyPr/>
+          <a:lstStyle/>
+          <a:p>
+            <a:pPr algn="r">
+              <a:buNone/>
+            </a:pPr>
+            <a:endParaRPr lang="en-US" dirty="0" smtClean="0"/>
+          </a:p>
+          <a:p>
+            <a:pPr algn="r">
+              <a:buNone/>
+            </a:pPr>
+            <a:endParaRPr lang="en-US" dirty="0" smtClean="0"/>
+          </a:p>
+          <a:p>
+            <a:pPr algn="r">
+              <a:buNone/>
+            </a:pPr>
+            <a:r>
+              <a:rPr lang="en-US" dirty="0" smtClean="0"/>
+              <a:t>David </a:t>
+            </a:r>
+            <a:r>
+              <a:rPr lang="en-US" dirty="0" err="1" smtClean="0"/>
+              <a:t>Mohundro</a:t>
+            </a:r>
+            <a:endParaRPr lang="en-US" dirty="0" smtClean="0"/>
+          </a:p>
+          <a:p>
+            <a:pPr algn="r">
+              <a:buNone/>
+            </a:pPr>
+            <a:r>
+              <a:rPr lang="en-US" dirty="0" smtClean="0">
+                <a:hlinkClick r:id="rId2"/>
+              </a:rPr>
+              <a:t>http://www.mohundro.com/blog/</a:t>
+            </a:r>
+            <a:endParaRPr lang="en-US" dirty="0" smtClean="0"/>
+          </a:p>
+          <a:p>
+            <a:pPr algn="r">
+              <a:buNone/>
+            </a:pPr>
+            <a:r>
+              <a:rPr lang="en-US" dirty="0" smtClean="0">
+                <a:hlinkClick r:id="rId3"/>
+              </a:rPr>
+              <a:t>http://twitter.com/drmohundro</a:t>
+            </a:r>
+            <a:endParaRPr lang="en-US" dirty="0" smtClean="0"/>
           </a:p>
         </p:txBody>
       </p:sp>

</xml_diff>

<commit_message>
Updated notes for upcoming talk.
</commit_message>
<xml_diff>
--- a/the-power-of-powershell/presentation.pptx
+++ b/the-power-of-powershell/presentation.pptx
@@ -5,10 +5,10 @@
     <p:sldMasterId id="2147483660" r:id="rId1"/>
   </p:sldMasterIdLst>
   <p:notesMasterIdLst>
-    <p:notesMasterId r:id="rId32"/>
+    <p:notesMasterId r:id="rId33"/>
   </p:notesMasterIdLst>
   <p:handoutMasterIdLst>
-    <p:handoutMasterId r:id="rId33"/>
+    <p:handoutMasterId r:id="rId34"/>
   </p:handoutMasterIdLst>
   <p:sldIdLst>
     <p:sldId id="256" r:id="rId2"/>
@@ -35,12 +35,13 @@
     <p:sldId id="277" r:id="rId23"/>
     <p:sldId id="278" r:id="rId24"/>
     <p:sldId id="283" r:id="rId25"/>
-    <p:sldId id="286" r:id="rId26"/>
-    <p:sldId id="287" r:id="rId27"/>
-    <p:sldId id="288" r:id="rId28"/>
-    <p:sldId id="289" r:id="rId29"/>
-    <p:sldId id="279" r:id="rId30"/>
-    <p:sldId id="284" r:id="rId31"/>
+    <p:sldId id="290" r:id="rId26"/>
+    <p:sldId id="286" r:id="rId27"/>
+    <p:sldId id="287" r:id="rId28"/>
+    <p:sldId id="288" r:id="rId29"/>
+    <p:sldId id="289" r:id="rId30"/>
+    <p:sldId id="279" r:id="rId31"/>
+    <p:sldId id="284" r:id="rId32"/>
   </p:sldIdLst>
   <p:sldSz cx="9144000" cy="6858000" type="screen4x3"/>
   <p:notesSz cx="6858000" cy="9144000"/>
@@ -225,7 +226,7 @@
             <a:fld id="{B9B93FB1-DF36-440F-A433-3E8F756D0415}" type="datetimeFigureOut">
               <a:rPr lang="en-US" smtClean="0"/>
               <a:pPr/>
-              <a:t>7/12/2009</a:t>
+              <a:t>9/13/2010</a:t>
             </a:fld>
             <a:endParaRPr lang="en-US"/>
           </a:p>
@@ -299,6 +300,11 @@
         </p:txBody>
       </p:sp>
     </p:spTree>
+    <p:extLst>
+      <p:ext uri="{BB962C8B-B14F-4D97-AF65-F5344CB8AC3E}">
+        <p14:creationId xmlns:p14="http://schemas.microsoft.com/office/powerpoint/2010/main" val="4195181625"/>
+      </p:ext>
+    </p:extLst>
   </p:cSld>
   <p:clrMap bg1="lt1" tx1="dk1" bg2="lt2" tx2="dk2" accent1="accent1" accent2="accent2" accent3="accent3" accent4="accent4" accent5="accent5" accent6="accent6" hlink="hlink" folHlink="folHlink"/>
 </p:handoutMaster>
@@ -387,7 +393,7 @@
             <a:fld id="{C89EC058-892F-4F50-9EA1-1F3B0A11E872}" type="datetimeFigureOut">
               <a:rPr lang="en-US" smtClean="0"/>
               <a:pPr/>
-              <a:t>7/12/2009</a:t>
+              <a:t>9/13/2010</a:t>
             </a:fld>
             <a:endParaRPr lang="en-US"/>
           </a:p>
@@ -556,6 +562,11 @@
         </p:txBody>
       </p:sp>
     </p:spTree>
+    <p:extLst>
+      <p:ext uri="{BB962C8B-B14F-4D97-AF65-F5344CB8AC3E}">
+        <p14:creationId xmlns:p14="http://schemas.microsoft.com/office/powerpoint/2010/main" val="3895214331"/>
+      </p:ext>
+    </p:extLst>
   </p:cSld>
   <p:clrMap bg1="lt1" tx1="dk1" bg2="lt2" tx2="dk2" accent1="accent1" accent2="accent2" accent3="accent3" accent4="accent4" accent5="accent5" accent6="accent6" hlink="hlink" folHlink="folHlink"/>
   <p:notesStyle>
@@ -4399,7 +4410,7 @@
             <a:fld id="{5FD7F0AD-5F3B-4E9C-B332-A6DF54A738BE}" type="slidenum">
               <a:rPr lang="en-US" smtClean="0"/>
               <a:pPr/>
-              <a:t>25</a:t>
+              <a:t>26</a:t>
             </a:fld>
             <a:endParaRPr lang="en-US"/>
           </a:p>
@@ -4489,7 +4500,7 @@
             <a:fld id="{5FD7F0AD-5F3B-4E9C-B332-A6DF54A738BE}" type="slidenum">
               <a:rPr lang="en-US" smtClean="0"/>
               <a:pPr/>
-              <a:t>26</a:t>
+              <a:t>27</a:t>
             </a:fld>
             <a:endParaRPr lang="en-US"/>
           </a:p>
@@ -4661,7 +4672,7 @@
             <a:fld id="{5FD7F0AD-5F3B-4E9C-B332-A6DF54A738BE}" type="slidenum">
               <a:rPr lang="en-US" smtClean="0"/>
               <a:pPr/>
-              <a:t>27</a:t>
+              <a:t>28</a:t>
             </a:fld>
             <a:endParaRPr lang="en-US"/>
           </a:p>
@@ -4772,7 +4783,7 @@
             <a:fld id="{5FD7F0AD-5F3B-4E9C-B332-A6DF54A738BE}" type="slidenum">
               <a:rPr lang="en-US" smtClean="0"/>
               <a:pPr/>
-              <a:t>29</a:t>
+              <a:t>30</a:t>
             </a:fld>
             <a:endParaRPr lang="en-US"/>
           </a:p>
@@ -7250,7 +7261,7 @@
             <a:fld id="{85F33A90-6586-4AF8-955D-4A449BF70A77}" type="datetimeFigureOut">
               <a:rPr lang="en-US" smtClean="0"/>
               <a:pPr/>
-              <a:t>7/12/2009</a:t>
+              <a:t>9/13/2010</a:t>
             </a:fld>
             <a:endParaRPr lang="en-US"/>
           </a:p>
@@ -7441,7 +7452,7 @@
             <a:fld id="{85F33A90-6586-4AF8-955D-4A449BF70A77}" type="datetimeFigureOut">
               <a:rPr lang="en-US" smtClean="0"/>
               <a:pPr/>
-              <a:t>7/12/2009</a:t>
+              <a:t>9/13/2010</a:t>
             </a:fld>
             <a:endParaRPr lang="en-US"/>
           </a:p>
@@ -7618,7 +7629,7 @@
             <a:fld id="{85F33A90-6586-4AF8-955D-4A449BF70A77}" type="datetimeFigureOut">
               <a:rPr lang="en-US" smtClean="0"/>
               <a:pPr/>
-              <a:t>7/12/2009</a:t>
+              <a:t>9/13/2010</a:t>
             </a:fld>
             <a:endParaRPr lang="en-US"/>
           </a:p>
@@ -7789,7 +7800,7 @@
             <a:fld id="{85F33A90-6586-4AF8-955D-4A449BF70A77}" type="datetimeFigureOut">
               <a:rPr lang="en-US" smtClean="0"/>
               <a:pPr/>
-              <a:t>7/12/2009</a:t>
+              <a:t>9/13/2010</a:t>
             </a:fld>
             <a:endParaRPr lang="en-US"/>
           </a:p>
@@ -8246,7 +8257,7 @@
             <a:fld id="{85F33A90-6586-4AF8-955D-4A449BF70A77}" type="datetimeFigureOut">
               <a:rPr lang="en-US" smtClean="0"/>
               <a:pPr/>
-              <a:t>7/12/2009</a:t>
+              <a:t>9/13/2010</a:t>
             </a:fld>
             <a:endParaRPr lang="en-US"/>
           </a:p>
@@ -8536,7 +8547,7 @@
             <a:fld id="{85F33A90-6586-4AF8-955D-4A449BF70A77}" type="datetimeFigureOut">
               <a:rPr lang="en-US" smtClean="0"/>
               <a:pPr/>
-              <a:t>7/12/2009</a:t>
+              <a:t>9/13/2010</a:t>
             </a:fld>
             <a:endParaRPr lang="en-US"/>
           </a:p>
@@ -8912,7 +8923,7 @@
             <a:fld id="{85F33A90-6586-4AF8-955D-4A449BF70A77}" type="datetimeFigureOut">
               <a:rPr lang="en-US" smtClean="0"/>
               <a:pPr/>
-              <a:t>7/12/2009</a:t>
+              <a:t>9/13/2010</a:t>
             </a:fld>
             <a:endParaRPr lang="en-US"/>
           </a:p>
@@ -9060,7 +9071,7 @@
             <a:fld id="{85F33A90-6586-4AF8-955D-4A449BF70A77}" type="datetimeFigureOut">
               <a:rPr lang="en-US" smtClean="0"/>
               <a:pPr/>
-              <a:t>7/12/2009</a:t>
+              <a:t>9/13/2010</a:t>
             </a:fld>
             <a:endParaRPr lang="en-US"/>
           </a:p>
@@ -9152,7 +9163,7 @@
             <a:fld id="{85F33A90-6586-4AF8-955D-4A449BF70A77}" type="datetimeFigureOut">
               <a:rPr lang="en-US" smtClean="0"/>
               <a:pPr/>
-              <a:t>7/12/2009</a:t>
+              <a:t>9/13/2010</a:t>
             </a:fld>
             <a:endParaRPr lang="en-US"/>
           </a:p>
@@ -9403,7 +9414,7 @@
             <a:fld id="{85F33A90-6586-4AF8-955D-4A449BF70A77}" type="datetimeFigureOut">
               <a:rPr lang="en-US" smtClean="0"/>
               <a:pPr/>
-              <a:t>7/12/2009</a:t>
+              <a:t>9/13/2010</a:t>
             </a:fld>
             <a:endParaRPr lang="en-US"/>
           </a:p>
@@ -9664,7 +9675,7 @@
             <a:fld id="{85F33A90-6586-4AF8-955D-4A449BF70A77}" type="datetimeFigureOut">
               <a:rPr lang="en-US" smtClean="0"/>
               <a:pPr/>
-              <a:t>7/12/2009</a:t>
+              <a:t>9/13/2010</a:t>
             </a:fld>
             <a:endParaRPr lang="en-US"/>
           </a:p>
@@ -10094,7 +10105,7 @@
             <a:fld id="{85F33A90-6586-4AF8-955D-4A449BF70A77}" type="datetimeFigureOut">
               <a:rPr lang="en-US" smtClean="0"/>
               <a:pPr/>
-              <a:t>7/12/2009</a:t>
+              <a:t>9/13/2010</a:t>
             </a:fld>
             <a:endParaRPr lang="en-US"/>
           </a:p>
@@ -10593,14 +10604,19 @@
             <a:pPr algn="r"/>
             <a:r>
               <a:rPr lang="en-US" dirty="0" smtClean="0"/>
-              <a:t>Little Rock DNUG</a:t>
-            </a:r>
+              <a:t>ITT Tech</a:t>
+            </a:r>
+            <a:endParaRPr lang="en-US" dirty="0" smtClean="0"/>
           </a:p>
           <a:p>
             <a:pPr algn="r"/>
             <a:r>
               <a:rPr lang="en-US" dirty="0" smtClean="0"/>
-              <a:t>July 13, 2009</a:t>
+              <a:t>September 17, </a:t>
+            </a:r>
+            <a:r>
+              <a:rPr lang="en-US" dirty="0" smtClean="0"/>
+              <a:t>2009</a:t>
             </a:r>
           </a:p>
           <a:p>
@@ -12079,20 +12095,8 @@
           <a:lstStyle/>
           <a:p>
             <a:r>
-              <a:rPr lang="en-US" smtClean="0"/>
-              <a:t>What </a:t>
-            </a:r>
-            <a:r>
-              <a:rPr lang="en-US" dirty="0" smtClean="0"/>
-              <a:t>is </a:t>
-            </a:r>
-            <a:r>
-              <a:rPr lang="en-US" dirty="0" err="1" smtClean="0"/>
-              <a:t>PowerShell</a:t>
-            </a:r>
-            <a:r>
-              <a:rPr lang="en-US" dirty="0" smtClean="0"/>
-              <a:t>?</a:t>
+              <a:rPr lang="en-US" dirty="0" smtClean="0"/>
+              <a:t>What is PowerShell?</a:t>
             </a:r>
           </a:p>
           <a:p>
@@ -12122,7 +12126,7 @@
           <a:p>
             <a:r>
               <a:rPr lang="en-US" dirty="0" smtClean="0"/>
-              <a:t>What’s coming in Version 2?</a:t>
+              <a:t>What can it do?</a:t>
             </a:r>
             <a:endParaRPr lang="en-US" dirty="0"/>
           </a:p>
@@ -13029,7 +13033,11 @@
           <a:p>
             <a:r>
               <a:rPr lang="en-US" dirty="0" smtClean="0"/>
-              <a:t>Integration with Microsoft Tools</a:t>
+              <a:t>Integration with </a:t>
+            </a:r>
+            <a:r>
+              <a:rPr lang="en-US" dirty="0" smtClean="0"/>
+              <a:t>Microsoft Tools</a:t>
             </a:r>
             <a:endParaRPr lang="en-US" dirty="0"/>
           </a:p>
@@ -13053,7 +13061,7 @@
         </p:spPr>
         <p:txBody>
           <a:bodyPr>
-            <a:normAutofit fontScale="70000" lnSpcReduction="20000"/>
+            <a:normAutofit fontScale="62500" lnSpcReduction="20000"/>
           </a:bodyPr>
           <a:lstStyle/>
           <a:p>
@@ -13099,26 +13107,37 @@
               <a:t>IIS7 </a:t>
             </a:r>
             <a:r>
+              <a:rPr lang="en-US" dirty="0" smtClean="0"/>
+              <a:t>PowerShell Provider (Import-Module </a:t>
+            </a:r>
+            <a:r>
               <a:rPr lang="en-US" dirty="0" err="1" smtClean="0"/>
-              <a:t>PowerShell</a:t>
-            </a:r>
-            <a:r>
-              <a:rPr lang="en-US" dirty="0" smtClean="0"/>
-              <a:t> Provider RC1</a:t>
-            </a:r>
-          </a:p>
-          <a:p>
-            <a:r>
-              <a:rPr lang="en-US" dirty="0" smtClean="0"/>
-              <a:t>Windows Server 2008</a:t>
-            </a:r>
+              <a:t>WebAdministration</a:t>
+            </a:r>
+            <a:r>
+              <a:rPr lang="en-US" dirty="0" smtClean="0"/>
+              <a:t>)</a:t>
+            </a:r>
+            <a:endParaRPr lang="en-US" dirty="0" smtClean="0"/>
+          </a:p>
+          <a:p>
+            <a:r>
+              <a:rPr lang="en-US" dirty="0" smtClean="0"/>
+              <a:t>Windows Server </a:t>
+            </a:r>
+            <a:r>
+              <a:rPr lang="en-US" dirty="0" smtClean="0"/>
+              <a:t>2008 R2</a:t>
+            </a:r>
+            <a:endParaRPr lang="en-US" dirty="0" smtClean="0"/>
           </a:p>
           <a:p>
             <a:pPr lvl="1"/>
             <a:r>
               <a:rPr lang="en-US" dirty="0" smtClean="0"/>
-              <a:t>Included as a component instead of a separate download</a:t>
-            </a:r>
+              <a:t>Installed by default!</a:t>
+            </a:r>
+            <a:endParaRPr lang="en-US" dirty="0" smtClean="0"/>
           </a:p>
           <a:p>
             <a:r>
@@ -13153,16 +13172,19 @@
             <a:pPr lvl="1"/>
             <a:r>
               <a:rPr lang="en-US" dirty="0" smtClean="0"/>
-              <a:t>All future administration GUIs will be built on </a:t>
-            </a:r>
-            <a:r>
-              <a:rPr lang="en-US" dirty="0" err="1" smtClean="0"/>
-              <a:t>PowerShell</a:t>
-            </a:r>
-            <a:r>
-              <a:rPr lang="en-US" dirty="0" smtClean="0"/>
-              <a:t> (allows scripting anything)</a:t>
-            </a:r>
+              <a:t>All future administration GUIs will be built on PowerShell (allows scripting anything</a:t>
+            </a:r>
+            <a:r>
+              <a:rPr lang="en-US" dirty="0" smtClean="0"/>
+              <a:t>)</a:t>
+            </a:r>
+          </a:p>
+          <a:p>
+            <a:r>
+              <a:rPr lang="en-US" dirty="0" smtClean="0"/>
+              <a:t>And more!!!</a:t>
+            </a:r>
+            <a:endParaRPr lang="en-US" dirty="0" smtClean="0"/>
           </a:p>
           <a:p>
             <a:pPr lvl="1"/>
@@ -13263,6 +13285,150 @@
         </p:nvSpPr>
         <p:spPr/>
         <p:txBody>
+          <a:bodyPr/>
+          <a:lstStyle/>
+          <a:p>
+            <a:r>
+              <a:rPr lang="en-US" dirty="0" smtClean="0"/>
+              <a:t>But… what else can it do?</a:t>
+            </a:r>
+            <a:endParaRPr lang="en-US" dirty="0"/>
+          </a:p>
+        </p:txBody>
+      </p:sp>
+      <p:sp>
+        <p:nvSpPr>
+          <p:cNvPr id="3" name="Content Placeholder 2"/>
+          <p:cNvSpPr>
+            <a:spLocks noGrp="1"/>
+          </p:cNvSpPr>
+          <p:nvPr>
+            <p:ph idx="1"/>
+          </p:nvPr>
+        </p:nvSpPr>
+        <p:spPr/>
+        <p:txBody>
+          <a:bodyPr>
+            <a:normAutofit/>
+          </a:bodyPr>
+          <a:lstStyle/>
+          <a:p>
+            <a:r>
+              <a:rPr lang="en-US" dirty="0" smtClean="0"/>
+              <a:t>IBM </a:t>
+            </a:r>
+            <a:r>
+              <a:rPr lang="en-US" dirty="0" err="1" smtClean="0"/>
+              <a:t>WebSphere</a:t>
+            </a:r>
+            <a:r>
+              <a:rPr lang="en-US" dirty="0" smtClean="0"/>
+              <a:t> MQ</a:t>
+            </a:r>
+          </a:p>
+          <a:p>
+            <a:pPr lvl="1"/>
+            <a:r>
+              <a:rPr lang="en-US" dirty="0" smtClean="0"/>
+              <a:t>PowerShell API to talk to </a:t>
+            </a:r>
+            <a:r>
+              <a:rPr lang="en-US" dirty="0" err="1" smtClean="0"/>
+              <a:t>WebSphere</a:t>
+            </a:r>
+            <a:endParaRPr lang="en-US" dirty="0" smtClean="0"/>
+          </a:p>
+          <a:p>
+            <a:r>
+              <a:rPr lang="en-US" dirty="0" smtClean="0"/>
+              <a:t>VMware Infrastructure Toolkit</a:t>
+            </a:r>
+          </a:p>
+          <a:p>
+            <a:pPr lvl="1"/>
+            <a:r>
+              <a:rPr lang="en-US" dirty="0" smtClean="0"/>
+              <a:t>Manage VMware virtual machines</a:t>
+            </a:r>
+          </a:p>
+          <a:p>
+            <a:r>
+              <a:rPr lang="en-US" dirty="0" smtClean="0"/>
+              <a:t>Intel </a:t>
+            </a:r>
+            <a:r>
+              <a:rPr lang="en-US" dirty="0" err="1" smtClean="0"/>
+              <a:t>vPro</a:t>
+            </a:r>
+            <a:r>
+              <a:rPr lang="en-US" dirty="0" smtClean="0"/>
+              <a:t> PowerShell Module</a:t>
+            </a:r>
+          </a:p>
+          <a:p>
+            <a:pPr lvl="1"/>
+            <a:r>
+              <a:rPr lang="en-US" dirty="0" smtClean="0"/>
+              <a:t>Power and CPU management</a:t>
+            </a:r>
+          </a:p>
+          <a:p>
+            <a:r>
+              <a:rPr lang="en-US" dirty="0" smtClean="0"/>
+              <a:t>Web Farm Framework 2.0 for IIS7</a:t>
+            </a:r>
+          </a:p>
+          <a:p>
+            <a:pPr lvl="1"/>
+            <a:r>
+              <a:rPr lang="en-US" dirty="0" smtClean="0"/>
+              <a:t>Configure/Manage server farm</a:t>
+            </a:r>
+          </a:p>
+        </p:txBody>
+      </p:sp>
+    </p:spTree>
+    <p:extLst>
+      <p:ext uri="{BB962C8B-B14F-4D97-AF65-F5344CB8AC3E}">
+        <p14:creationId xmlns:p14="http://schemas.microsoft.com/office/powerpoint/2010/main" val="920917050"/>
+      </p:ext>
+    </p:extLst>
+  </p:cSld>
+  <p:clrMapOvr>
+    <a:masterClrMapping/>
+  </p:clrMapOvr>
+</p:sld>
+</file>
+
+<file path=ppt/slides/slide26.xml><?xml version="1.0" encoding="utf-8"?>
+<p:sld xmlns:a="http://schemas.openxmlformats.org/drawingml/2006/main" xmlns:r="http://schemas.openxmlformats.org/officeDocument/2006/relationships" xmlns:p="http://schemas.openxmlformats.org/presentationml/2006/main">
+  <p:cSld>
+    <p:spTree>
+      <p:nvGrpSpPr>
+        <p:cNvPr id="1" name=""/>
+        <p:cNvGrpSpPr/>
+        <p:nvPr/>
+      </p:nvGrpSpPr>
+      <p:grpSpPr>
+        <a:xfrm>
+          <a:off x="0" y="0"/>
+          <a:ext cx="0" cy="0"/>
+          <a:chOff x="0" y="0"/>
+          <a:chExt cx="0" cy="0"/>
+        </a:xfrm>
+      </p:grpSpPr>
+      <p:sp>
+        <p:nvSpPr>
+          <p:cNvPr id="2" name="Title 1"/>
+          <p:cNvSpPr>
+            <a:spLocks noGrp="1"/>
+          </p:cNvSpPr>
+          <p:nvPr>
+            <p:ph type="title"/>
+          </p:nvPr>
+        </p:nvSpPr>
+        <p:spPr/>
+        <p:txBody>
           <a:bodyPr>
             <a:normAutofit/>
           </a:bodyPr>
@@ -13406,7 +13572,7 @@
 </p:sld>
 </file>
 
-<file path=ppt/slides/slide26.xml><?xml version="1.0" encoding="utf-8"?>
+<file path=ppt/slides/slide27.xml><?xml version="1.0" encoding="utf-8"?>
 <p:sld xmlns:a="http://schemas.openxmlformats.org/drawingml/2006/main" xmlns:r="http://schemas.openxmlformats.org/officeDocument/2006/relationships" xmlns:p="http://schemas.openxmlformats.org/presentationml/2006/main">
   <p:cSld>
     <p:spTree>
@@ -13788,7 +13954,7 @@
 </p:sld>
 </file>
 
-<file path=ppt/slides/slide27.xml><?xml version="1.0" encoding="utf-8"?>
+<file path=ppt/slides/slide28.xml><?xml version="1.0" encoding="utf-8"?>
 <p:sld xmlns:a="http://schemas.openxmlformats.org/drawingml/2006/main" xmlns:r="http://schemas.openxmlformats.org/officeDocument/2006/relationships" xmlns:p="http://schemas.openxmlformats.org/presentationml/2006/main">
   <p:cSld>
     <p:spTree>
@@ -13970,7 +14136,7 @@
 </p:sld>
 </file>
 
-<file path=ppt/slides/slide28.xml><?xml version="1.0" encoding="utf-8"?>
+<file path=ppt/slides/slide29.xml><?xml version="1.0" encoding="utf-8"?>
 <p:sld xmlns:a="http://schemas.openxmlformats.org/drawingml/2006/main" xmlns:r="http://schemas.openxmlformats.org/officeDocument/2006/relationships" xmlns:p="http://schemas.openxmlformats.org/presentationml/2006/main">
   <p:cSld>
     <p:spTree>
@@ -14136,7 +14302,7 @@
               <a:rPr lang="en-US" dirty="0" smtClean="0">
                 <a:hlinkClick r:id="rId4"/>
               </a:rPr>
-              <a:t>github.com/drmohundro/Find-String/tree/master</a:t>
+              <a:t>github.com/drmohundro/Find-String/</a:t>
             </a:r>
             <a:endParaRPr lang="en-US" dirty="0"/>
           </a:p>
@@ -14147,159 +14313,6 @@
   <p:clrMapOvr>
     <a:masterClrMapping/>
   </p:clrMapOvr>
-</p:sld>
-</file>
-
-<file path=ppt/slides/slide29.xml><?xml version="1.0" encoding="utf-8"?>
-<p:sld xmlns:a="http://schemas.openxmlformats.org/drawingml/2006/main" xmlns:r="http://schemas.openxmlformats.org/officeDocument/2006/relationships" xmlns:p="http://schemas.openxmlformats.org/presentationml/2006/main">
-  <p:cSld>
-    <p:spTree>
-      <p:nvGrpSpPr>
-        <p:cNvPr id="1" name=""/>
-        <p:cNvGrpSpPr/>
-        <p:nvPr/>
-      </p:nvGrpSpPr>
-      <p:grpSpPr>
-        <a:xfrm>
-          <a:off x="0" y="0"/>
-          <a:ext cx="0" cy="0"/>
-          <a:chOff x="0" y="0"/>
-          <a:chExt cx="0" cy="0"/>
-        </a:xfrm>
-      </p:grpSpPr>
-      <p:sp>
-        <p:nvSpPr>
-          <p:cNvPr id="2" name="Title 1"/>
-          <p:cNvSpPr>
-            <a:spLocks noGrp="1"/>
-          </p:cNvSpPr>
-          <p:nvPr>
-            <p:ph type="title"/>
-          </p:nvPr>
-        </p:nvSpPr>
-        <p:spPr/>
-        <p:txBody>
-          <a:bodyPr/>
-          <a:lstStyle/>
-          <a:p>
-            <a:r>
-              <a:rPr lang="en-US" dirty="0" smtClean="0"/>
-              <a:t>What’s next for </a:t>
-            </a:r>
-            <a:r>
-              <a:rPr lang="en-US" dirty="0" err="1" smtClean="0"/>
-              <a:t>PowerShell</a:t>
-            </a:r>
-            <a:r>
-              <a:rPr lang="en-US" dirty="0" smtClean="0"/>
-              <a:t>?</a:t>
-            </a:r>
-            <a:endParaRPr lang="en-US" dirty="0"/>
-          </a:p>
-        </p:txBody>
-      </p:sp>
-      <p:sp>
-        <p:nvSpPr>
-          <p:cNvPr id="3" name="Content Placeholder 2"/>
-          <p:cNvSpPr>
-            <a:spLocks noGrp="1"/>
-          </p:cNvSpPr>
-          <p:nvPr>
-            <p:ph idx="1"/>
-          </p:nvPr>
-        </p:nvSpPr>
-        <p:spPr/>
-        <p:txBody>
-          <a:bodyPr/>
-          <a:lstStyle/>
-          <a:p>
-            <a:r>
-              <a:rPr lang="en-US" dirty="0" err="1" smtClean="0">
-                <a:hlinkClick r:id="rId3"/>
-              </a:rPr>
-              <a:t>PowerShell</a:t>
-            </a:r>
-            <a:r>
-              <a:rPr lang="en-US" dirty="0" smtClean="0">
-                <a:hlinkClick r:id="rId3"/>
-              </a:rPr>
-              <a:t> V2 CTP3 is out</a:t>
-            </a:r>
-            <a:endParaRPr lang="en-US" dirty="0" smtClean="0"/>
-          </a:p>
-          <a:p>
-            <a:r>
-              <a:rPr lang="en-US" dirty="0" smtClean="0"/>
-              <a:t>Version 2 is considered feature complete</a:t>
-            </a:r>
-          </a:p>
-          <a:p>
-            <a:r>
-              <a:rPr lang="en-US" dirty="0" smtClean="0"/>
-              <a:t>Some features:</a:t>
-            </a:r>
-          </a:p>
-          <a:p>
-            <a:pPr lvl="1"/>
-            <a:r>
-              <a:rPr lang="en-US" dirty="0" err="1" smtClean="0"/>
-              <a:t>Remoting</a:t>
-            </a:r>
-            <a:r>
-              <a:rPr lang="en-US" dirty="0" smtClean="0"/>
-              <a:t> </a:t>
-            </a:r>
-            <a:r>
-              <a:rPr lang="en-US" dirty="0" smtClean="0"/>
-              <a:t>support (</a:t>
-            </a:r>
-            <a:r>
-              <a:rPr lang="en-US" smtClean="0"/>
-              <a:t>see remoting-demo.txt)</a:t>
-            </a:r>
-            <a:endParaRPr lang="en-US" dirty="0" smtClean="0"/>
-          </a:p>
-          <a:p>
-            <a:pPr lvl="1"/>
-            <a:r>
-              <a:rPr lang="en-US" dirty="0" smtClean="0"/>
-              <a:t>Job </a:t>
-            </a:r>
-            <a:r>
-              <a:rPr lang="en-US" dirty="0" smtClean="0"/>
-              <a:t>support (see job-demo.txt)</a:t>
-            </a:r>
-            <a:endParaRPr lang="en-US" dirty="0" smtClean="0"/>
-          </a:p>
-          <a:p>
-            <a:pPr lvl="1"/>
-            <a:r>
-              <a:rPr lang="en-US" dirty="0" smtClean="0"/>
-              <a:t>Graphical Console</a:t>
-            </a:r>
-          </a:p>
-          <a:p>
-            <a:pPr lvl="1"/>
-            <a:r>
-              <a:rPr lang="en-US" dirty="0" smtClean="0"/>
-              <a:t>Transactions</a:t>
-            </a:r>
-            <a:endParaRPr lang="en-US" dirty="0"/>
-          </a:p>
-        </p:txBody>
-      </p:sp>
-    </p:spTree>
-  </p:cSld>
-  <p:clrMapOvr>
-    <a:masterClrMapping/>
-  </p:clrMapOvr>
-  <p:timing>
-    <p:tnLst>
-      <p:par>
-        <p:cTn id="1" dur="indefinite" restart="never" nodeType="tmRoot"/>
-      </p:par>
-    </p:tnLst>
-  </p:timing>
 </p:sld>
 </file>
 
@@ -14484,6 +14497,129 @@
           <a:p>
             <a:r>
               <a:rPr lang="en-US" dirty="0" smtClean="0"/>
+              <a:t>Even </a:t>
+            </a:r>
+            <a:r>
+              <a:rPr lang="en-US" b="1" dirty="0" smtClean="0"/>
+              <a:t>MORE</a:t>
+            </a:r>
+            <a:r>
+              <a:rPr lang="en-US" dirty="0" smtClean="0"/>
+              <a:t> Features</a:t>
+            </a:r>
+            <a:endParaRPr lang="en-US" dirty="0"/>
+          </a:p>
+        </p:txBody>
+      </p:sp>
+      <p:sp>
+        <p:nvSpPr>
+          <p:cNvPr id="3" name="Content Placeholder 2"/>
+          <p:cNvSpPr>
+            <a:spLocks noGrp="1"/>
+          </p:cNvSpPr>
+          <p:nvPr>
+            <p:ph idx="1"/>
+          </p:nvPr>
+        </p:nvSpPr>
+        <p:spPr/>
+        <p:txBody>
+          <a:bodyPr/>
+          <a:lstStyle/>
+          <a:p>
+            <a:r>
+              <a:rPr lang="en-US" dirty="0" err="1" smtClean="0"/>
+              <a:t>Remoting</a:t>
+            </a:r>
+            <a:r>
+              <a:rPr lang="en-US" dirty="0" smtClean="0"/>
+              <a:t> </a:t>
+            </a:r>
+            <a:r>
+              <a:rPr lang="en-US" dirty="0" smtClean="0"/>
+              <a:t>support (see remoting-demo.txt)</a:t>
+            </a:r>
+          </a:p>
+          <a:p>
+            <a:r>
+              <a:rPr lang="en-US" dirty="0" smtClean="0"/>
+              <a:t>Job support (see job-demo.txt)</a:t>
+            </a:r>
+          </a:p>
+          <a:p>
+            <a:r>
+              <a:rPr lang="en-US" dirty="0" smtClean="0"/>
+              <a:t>Graphical </a:t>
+            </a:r>
+            <a:r>
+              <a:rPr lang="en-US" dirty="0" smtClean="0"/>
+              <a:t>Console (ISE)</a:t>
+            </a:r>
+            <a:endParaRPr lang="en-US" dirty="0" smtClean="0"/>
+          </a:p>
+          <a:p>
+            <a:r>
+              <a:rPr lang="en-US" dirty="0" smtClean="0"/>
+              <a:t>Transactions</a:t>
+            </a:r>
+          </a:p>
+          <a:p>
+            <a:r>
+              <a:rPr lang="en-US" smtClean="0"/>
+              <a:t>Modules</a:t>
+            </a:r>
+            <a:endParaRPr lang="en-US" dirty="0"/>
+          </a:p>
+        </p:txBody>
+      </p:sp>
+    </p:spTree>
+  </p:cSld>
+  <p:clrMapOvr>
+    <a:masterClrMapping/>
+  </p:clrMapOvr>
+  <p:timing>
+    <p:tnLst>
+      <p:par>
+        <p:cTn id="1" dur="indefinite" restart="never" nodeType="tmRoot"/>
+      </p:par>
+    </p:tnLst>
+  </p:timing>
+</p:sld>
+</file>
+
+<file path=ppt/slides/slide31.xml><?xml version="1.0" encoding="utf-8"?>
+<p:sld xmlns:a="http://schemas.openxmlformats.org/drawingml/2006/main" xmlns:r="http://schemas.openxmlformats.org/officeDocument/2006/relationships" xmlns:p="http://schemas.openxmlformats.org/presentationml/2006/main">
+  <p:cSld>
+    <p:spTree>
+      <p:nvGrpSpPr>
+        <p:cNvPr id="1" name=""/>
+        <p:cNvGrpSpPr/>
+        <p:nvPr/>
+      </p:nvGrpSpPr>
+      <p:grpSpPr>
+        <a:xfrm>
+          <a:off x="0" y="0"/>
+          <a:ext cx="0" cy="0"/>
+          <a:chOff x="0" y="0"/>
+          <a:chExt cx="0" cy="0"/>
+        </a:xfrm>
+      </p:grpSpPr>
+      <p:sp>
+        <p:nvSpPr>
+          <p:cNvPr id="2" name="Title 1"/>
+          <p:cNvSpPr>
+            <a:spLocks noGrp="1"/>
+          </p:cNvSpPr>
+          <p:nvPr>
+            <p:ph type="title"/>
+          </p:nvPr>
+        </p:nvSpPr>
+        <p:spPr/>
+        <p:txBody>
+          <a:bodyPr/>
+          <a:lstStyle/>
+          <a:p>
+            <a:r>
+              <a:rPr lang="en-US" dirty="0" smtClean="0"/>
               <a:t>Questions?</a:t>
             </a:r>
             <a:endParaRPr lang="en-US" dirty="0"/>
@@ -14596,8 +14732,8 @@
         </p:nvSpPr>
         <p:spPr>
           <a:xfrm>
-            <a:off x="2971800" y="4343400"/>
-            <a:ext cx="5943600" cy="2308324"/>
+            <a:off x="2971800" y="4114800"/>
+            <a:ext cx="5943600" cy="2585323"/>
           </a:xfrm>
           <a:prstGeom prst="rect">
             <a:avLst/>
@@ -14611,16 +14747,16 @@
           <a:lstStyle/>
           <a:p>
             <a:r>
-              <a:rPr lang="en-US" b="1" dirty="0" smtClean="0"/>
-              <a:t>Windows </a:t>
-            </a:r>
-            <a:r>
-              <a:rPr lang="en-US" b="1" dirty="0" err="1" smtClean="0"/>
-              <a:t>PowerShell</a:t>
-            </a:r>
-            <a:r>
-              <a:rPr lang="en-US" dirty="0" smtClean="0"/>
-              <a:t> is an extensible command-line shell and associated scripting language from Microsoft. It was released in 2006 and is currently available for Windows XP SP2, Windows Server 2003, Windows Vista and is included in Windows Server 2008 as an optional feature.</a:t>
+              <a:rPr lang="en-US" b="1" dirty="0"/>
+              <a:t>Windows PowerShell</a:t>
+            </a:r>
+            <a:r>
+              <a:rPr lang="en-US" dirty="0"/>
+              <a:t> is Microsoft's task automation framework, consisting of a command-line shell and associated scripting language built on top of, and integrated with, the .NET Framework. PowerShell provides full access to COM and WMI, enabling administrators to perform administrative tasks on both local and remote Windows </a:t>
+            </a:r>
+            <a:r>
+              <a:rPr lang="en-US" dirty="0" smtClean="0"/>
+              <a:t>systems.</a:t>
             </a:r>
           </a:p>
           <a:p>
@@ -14827,8 +14963,19 @@
           <a:p>
             <a:r>
               <a:rPr lang="en-US" dirty="0" smtClean="0"/>
-              <a:t>Version 1 released for Windows XP on November 14, 2006.</a:t>
-            </a:r>
+              <a:t>Version 1 released for Windows XP on November 14, 2006</a:t>
+            </a:r>
+            <a:r>
+              <a:rPr lang="en-US" dirty="0" smtClean="0"/>
+              <a:t>.</a:t>
+            </a:r>
+          </a:p>
+          <a:p>
+            <a:r>
+              <a:rPr lang="en-US" dirty="0" smtClean="0"/>
+              <a:t>Installed by default on Windows Server 2008 R2.</a:t>
+            </a:r>
+            <a:endParaRPr lang="en-US" dirty="0" smtClean="0"/>
           </a:p>
           <a:p>
             <a:r>
@@ -15025,12 +15172,12 @@
               <a:t>With </a:t>
             </a:r>
             <a:r>
-              <a:rPr lang="en-US" dirty="0" err="1" smtClean="0"/>
-              <a:t>Silverlight</a:t>
-            </a:r>
-            <a:r>
-              <a:rPr lang="en-US" dirty="0" smtClean="0"/>
-              <a:t>, WPF, WCF, LINQ, etc. on the horizon, who seriously cares about the command line?</a:t>
+              <a:rPr lang="en-US" dirty="0" smtClean="0"/>
+              <a:t>&lt;insert cool technology here&gt;, </a:t>
+            </a:r>
+            <a:r>
+              <a:rPr lang="en-US" dirty="0" smtClean="0"/>
+              <a:t>who seriously cares about the command line?</a:t>
             </a:r>
             <a:endParaRPr lang="en-US" dirty="0"/>
           </a:p>

</xml_diff>